<commit_message>
1. 更新demo 2. update .gitignore
</commit_message>
<xml_diff>
--- a/blog/Lucene/Index/索引文件的生成/索引文件的生成（二十四）/fdx&&fdt&&fdm.pptx
+++ b/blog/Lucene/Index/索引文件的生成/索引文件的生成（二十四）/fdx&&fdt&&fdm.pptx
@@ -277,7 +277,7 @@
           <a:p>
             <a:fld id="{2579BE28-8116-0E46-93C2-74159096E69E}" type="datetimeFigureOut">
               <a:rPr kumimoji="1" lang="zh-CN" altLang="en-US" smtClean="0"/>
-              <a:t>2020/10/16</a:t>
+              <a:t>2020/10/19</a:t>
             </a:fld>
             <a:endParaRPr kumimoji="1" lang="zh-CN" altLang="en-US"/>
           </a:p>
@@ -475,7 +475,7 @@
           <a:p>
             <a:fld id="{2579BE28-8116-0E46-93C2-74159096E69E}" type="datetimeFigureOut">
               <a:rPr kumimoji="1" lang="zh-CN" altLang="en-US" smtClean="0"/>
-              <a:t>2020/10/16</a:t>
+              <a:t>2020/10/19</a:t>
             </a:fld>
             <a:endParaRPr kumimoji="1" lang="zh-CN" altLang="en-US"/>
           </a:p>
@@ -683,7 +683,7 @@
           <a:p>
             <a:fld id="{2579BE28-8116-0E46-93C2-74159096E69E}" type="datetimeFigureOut">
               <a:rPr kumimoji="1" lang="zh-CN" altLang="en-US" smtClean="0"/>
-              <a:t>2020/10/16</a:t>
+              <a:t>2020/10/19</a:t>
             </a:fld>
             <a:endParaRPr kumimoji="1" lang="zh-CN" altLang="en-US"/>
           </a:p>
@@ -881,7 +881,7 @@
           <a:p>
             <a:fld id="{2579BE28-8116-0E46-93C2-74159096E69E}" type="datetimeFigureOut">
               <a:rPr kumimoji="1" lang="zh-CN" altLang="en-US" smtClean="0"/>
-              <a:t>2020/10/16</a:t>
+              <a:t>2020/10/19</a:t>
             </a:fld>
             <a:endParaRPr kumimoji="1" lang="zh-CN" altLang="en-US"/>
           </a:p>
@@ -1156,7 +1156,7 @@
           <a:p>
             <a:fld id="{2579BE28-8116-0E46-93C2-74159096E69E}" type="datetimeFigureOut">
               <a:rPr kumimoji="1" lang="zh-CN" altLang="en-US" smtClean="0"/>
-              <a:t>2020/10/16</a:t>
+              <a:t>2020/10/19</a:t>
             </a:fld>
             <a:endParaRPr kumimoji="1" lang="zh-CN" altLang="en-US"/>
           </a:p>
@@ -1421,7 +1421,7 @@
           <a:p>
             <a:fld id="{2579BE28-8116-0E46-93C2-74159096E69E}" type="datetimeFigureOut">
               <a:rPr kumimoji="1" lang="zh-CN" altLang="en-US" smtClean="0"/>
-              <a:t>2020/10/16</a:t>
+              <a:t>2020/10/19</a:t>
             </a:fld>
             <a:endParaRPr kumimoji="1" lang="zh-CN" altLang="en-US"/>
           </a:p>
@@ -1833,7 +1833,7 @@
           <a:p>
             <a:fld id="{2579BE28-8116-0E46-93C2-74159096E69E}" type="datetimeFigureOut">
               <a:rPr kumimoji="1" lang="zh-CN" altLang="en-US" smtClean="0"/>
-              <a:t>2020/10/16</a:t>
+              <a:t>2020/10/19</a:t>
             </a:fld>
             <a:endParaRPr kumimoji="1" lang="zh-CN" altLang="en-US"/>
           </a:p>
@@ -1974,7 +1974,7 @@
           <a:p>
             <a:fld id="{2579BE28-8116-0E46-93C2-74159096E69E}" type="datetimeFigureOut">
               <a:rPr kumimoji="1" lang="zh-CN" altLang="en-US" smtClean="0"/>
-              <a:t>2020/10/16</a:t>
+              <a:t>2020/10/19</a:t>
             </a:fld>
             <a:endParaRPr kumimoji="1" lang="zh-CN" altLang="en-US"/>
           </a:p>
@@ -2087,7 +2087,7 @@
           <a:p>
             <a:fld id="{2579BE28-8116-0E46-93C2-74159096E69E}" type="datetimeFigureOut">
               <a:rPr kumimoji="1" lang="zh-CN" altLang="en-US" smtClean="0"/>
-              <a:t>2020/10/16</a:t>
+              <a:t>2020/10/19</a:t>
             </a:fld>
             <a:endParaRPr kumimoji="1" lang="zh-CN" altLang="en-US"/>
           </a:p>
@@ -2398,7 +2398,7 @@
           <a:p>
             <a:fld id="{2579BE28-8116-0E46-93C2-74159096E69E}" type="datetimeFigureOut">
               <a:rPr kumimoji="1" lang="zh-CN" altLang="en-US" smtClean="0"/>
-              <a:t>2020/10/16</a:t>
+              <a:t>2020/10/19</a:t>
             </a:fld>
             <a:endParaRPr kumimoji="1" lang="zh-CN" altLang="en-US"/>
           </a:p>
@@ -2686,7 +2686,7 @@
           <a:p>
             <a:fld id="{2579BE28-8116-0E46-93C2-74159096E69E}" type="datetimeFigureOut">
               <a:rPr kumimoji="1" lang="zh-CN" altLang="en-US" smtClean="0"/>
-              <a:t>2020/10/16</a:t>
+              <a:t>2020/10/19</a:t>
             </a:fld>
             <a:endParaRPr kumimoji="1" lang="zh-CN" altLang="en-US"/>
           </a:p>
@@ -2927,7 +2927,7 @@
           <a:p>
             <a:fld id="{2579BE28-8116-0E46-93C2-74159096E69E}" type="datetimeFigureOut">
               <a:rPr kumimoji="1" lang="zh-CN" altLang="en-US" smtClean="0"/>
-              <a:t>2020/10/16</a:t>
+              <a:t>2020/10/19</a:t>
             </a:fld>
             <a:endParaRPr kumimoji="1" lang="zh-CN" altLang="en-US"/>
           </a:p>
@@ -13109,14 +13109,14 @@
           <p:nvPr>
             <p:extLst>
               <p:ext uri="{D42A27DB-BD31-4B8C-83A1-F6EECF244321}">
-                <p14:modId xmlns:p14="http://schemas.microsoft.com/office/powerpoint/2010/main" val="945634023"/>
+                <p14:modId xmlns:p14="http://schemas.microsoft.com/office/powerpoint/2010/main" val="3533970402"/>
               </p:ext>
             </p:extLst>
           </p:nvPr>
         </p:nvGraphicFramePr>
         <p:xfrm>
-          <a:off x="871869" y="2716616"/>
-          <a:ext cx="10240927" cy="370840"/>
+          <a:off x="92597" y="2716616"/>
+          <a:ext cx="11979799" cy="370840"/>
         </p:xfrm>
         <a:graphic>
           <a:graphicData uri="http://schemas.openxmlformats.org/drawingml/2006/table">
@@ -13125,63 +13125,77 @@
                 <a:tableStyleId>{5C22544A-7EE6-4342-B048-85BDC9FD1C3A}</a:tableStyleId>
               </a:tblPr>
               <a:tblGrid>
-                <a:gridCol w="788245">
+                <a:gridCol w="717631">
                   <a:extLst>
                     <a:ext uri="{9D8B030D-6E8A-4147-A177-3AD203B41FA5}">
                       <a16:colId xmlns:a16="http://schemas.microsoft.com/office/drawing/2014/main" val="2278590028"/>
                     </a:ext>
                   </a:extLst>
                 </a:gridCol>
-                <a:gridCol w="910235">
+                <a:gridCol w="914400">
                   <a:extLst>
                     <a:ext uri="{9D8B030D-6E8A-4147-A177-3AD203B41FA5}">
                       <a16:colId xmlns:a16="http://schemas.microsoft.com/office/drawing/2014/main" val="2845361826"/>
                     </a:ext>
                   </a:extLst>
                 </a:gridCol>
-                <a:gridCol w="1041609">
+                <a:gridCol w="887600">
                   <a:extLst>
                     <a:ext uri="{9D8B030D-6E8A-4147-A177-3AD203B41FA5}">
                       <a16:colId xmlns:a16="http://schemas.microsoft.com/office/drawing/2014/main" val="2192670918"/>
                     </a:ext>
                   </a:extLst>
                 </a:gridCol>
-                <a:gridCol w="1041609">
+                <a:gridCol w="1045372">
                   <a:extLst>
                     <a:ext uri="{9D8B030D-6E8A-4147-A177-3AD203B41FA5}">
                       <a16:colId xmlns:a16="http://schemas.microsoft.com/office/drawing/2014/main" val="912257723"/>
                     </a:ext>
                   </a:extLst>
                 </a:gridCol>
-                <a:gridCol w="1266822">
+                <a:gridCol w="1284790">
                   <a:extLst>
                     <a:ext uri="{9D8B030D-6E8A-4147-A177-3AD203B41FA5}">
                       <a16:colId xmlns:a16="http://schemas.microsoft.com/office/drawing/2014/main" val="3005407063"/>
                     </a:ext>
                   </a:extLst>
                 </a:gridCol>
-                <a:gridCol w="1341892">
+                <a:gridCol w="1307939">
                   <a:extLst>
                     <a:ext uri="{9D8B030D-6E8A-4147-A177-3AD203B41FA5}">
                       <a16:colId xmlns:a16="http://schemas.microsoft.com/office/drawing/2014/main" val="3113886429"/>
                     </a:ext>
                   </a:extLst>
                 </a:gridCol>
-                <a:gridCol w="1445115">
+                <a:gridCol w="1365813">
                   <a:extLst>
                     <a:ext uri="{9D8B030D-6E8A-4147-A177-3AD203B41FA5}">
                       <a16:colId xmlns:a16="http://schemas.microsoft.com/office/drawing/2014/main" val="3208990766"/>
                     </a:ext>
                   </a:extLst>
                 </a:gridCol>
-                <a:gridCol w="1393534">
+                <a:gridCol w="1400536">
                   <a:extLst>
                     <a:ext uri="{9D8B030D-6E8A-4147-A177-3AD203B41FA5}">
                       <a16:colId xmlns:a16="http://schemas.microsoft.com/office/drawing/2014/main" val="3517022100"/>
                     </a:ext>
                   </a:extLst>
                 </a:gridCol>
-                <a:gridCol w="1011866">
+                <a:gridCol w="1296365">
+                  <a:extLst>
+                    <a:ext uri="{9D8B030D-6E8A-4147-A177-3AD203B41FA5}">
+                      <a16:colId xmlns:a16="http://schemas.microsoft.com/office/drawing/2014/main" val="1446665914"/>
+                    </a:ext>
+                  </a:extLst>
+                </a:gridCol>
+                <a:gridCol w="1030147">
+                  <a:extLst>
+                    <a:ext uri="{9D8B030D-6E8A-4147-A177-3AD203B41FA5}">
+                      <a16:colId xmlns:a16="http://schemas.microsoft.com/office/drawing/2014/main" val="1340333125"/>
+                    </a:ext>
+                  </a:extLst>
+                </a:gridCol>
+                <a:gridCol w="729206">
                   <a:extLst>
                     <a:ext uri="{9D8B030D-6E8A-4147-A177-3AD203B41FA5}">
                       <a16:colId xmlns:a16="http://schemas.microsoft.com/office/drawing/2014/main" val="1094384035"/>
@@ -13339,7 +13353,7 @@
                     <a:p>
                       <a:pPr algn="ctr"/>
                       <a:r>
-                        <a:rPr lang="en-US" altLang="zh-CN" sz="1200" b="1" i="0" kern="1200" dirty="0">
+                        <a:rPr lang="en-US" altLang="zh-CN" sz="1200" b="1" i="0" kern="1200">
                           <a:solidFill>
                             <a:schemeClr val="tx1"/>
                           </a:solidFill>
@@ -13406,7 +13420,7 @@
                     <a:p>
                       <a:pPr algn="ctr"/>
                       <a:r>
-                        <a:rPr lang="en-US" altLang="zh-CN" sz="1200" b="1" i="0" dirty="0">
+                        <a:rPr lang="en-US" altLang="zh-CN" sz="1200" b="1" i="0">
                           <a:solidFill>
                             <a:schemeClr val="tx1"/>
                           </a:solidFill>
@@ -13471,7 +13485,7 @@
                     <a:p>
                       <a:pPr algn="ctr"/>
                       <a:r>
-                        <a:rPr lang="en-US" altLang="zh-CN" sz="1200" b="1" i="0" dirty="0">
+                        <a:rPr lang="en-US" altLang="zh-CN" sz="1200" b="1" i="0">
                           <a:solidFill>
                             <a:schemeClr val="tx1"/>
                           </a:solidFill>
@@ -13600,7 +13614,7 @@
                     <a:p>
                       <a:pPr algn="ctr"/>
                       <a:r>
-                        <a:rPr lang="en-US" altLang="zh-CN" sz="1200" b="1" i="0" kern="1200" dirty="0">
+                        <a:rPr lang="en-US" altLang="zh-CN" sz="1200" b="1" i="0" kern="1200">
                           <a:solidFill>
                             <a:schemeClr val="tx1"/>
                           </a:solidFill>
@@ -13669,7 +13683,7 @@
                     <a:p>
                       <a:pPr algn="ctr"/>
                       <a:r>
-                        <a:rPr lang="en-US" altLang="zh-CN" sz="1200" b="1" i="0" kern="1200" dirty="0">
+                        <a:rPr lang="en-US" altLang="zh-CN" sz="1200" b="1" i="0" kern="1200">
                           <a:solidFill>
                             <a:schemeClr val="tx1"/>
                           </a:solidFill>
@@ -13730,6 +13744,128 @@
                         <a:lumOff val="40000"/>
                       </a:schemeClr>
                     </a:solidFill>
+                  </a:tcPr>
+                </a:tc>
+                <a:tc>
+                  <a:txBody>
+                    <a:bodyPr/>
+                    <a:lstStyle/>
+                    <a:p>
+                      <a:pPr algn="ctr"/>
+                      <a:r>
+                        <a:rPr lang="en-US" altLang="zh-CN" sz="1200" b="1" i="0" dirty="0">
+                          <a:solidFill>
+                            <a:schemeClr val="tx1"/>
+                          </a:solidFill>
+                        </a:rPr>
+                        <a:t>SPEndPointer</a:t>
+                      </a:r>
+                      <a:endParaRPr lang="zh-CN" altLang="en-US" sz="1200" b="1" i="0" dirty="0">
+                        <a:solidFill>
+                          <a:schemeClr val="tx1"/>
+                        </a:solidFill>
+                      </a:endParaRPr>
+                    </a:p>
+                  </a:txBody>
+                  <a:tcPr anchor="ctr">
+                    <a:lnL w="12700" cap="flat" cmpd="sng" algn="ctr">
+                      <a:solidFill>
+                        <a:schemeClr val="tx1"/>
+                      </a:solidFill>
+                      <a:prstDash val="solid"/>
+                      <a:round/>
+                      <a:headEnd type="none" w="med" len="med"/>
+                      <a:tailEnd type="none" w="med" len="med"/>
+                    </a:lnL>
+                    <a:lnR w="12700" cap="flat" cmpd="sng" algn="ctr">
+                      <a:solidFill>
+                        <a:schemeClr val="tx1"/>
+                      </a:solidFill>
+                      <a:prstDash val="solid"/>
+                      <a:round/>
+                      <a:headEnd type="none" w="med" len="med"/>
+                      <a:tailEnd type="none" w="med" len="med"/>
+                    </a:lnR>
+                    <a:lnT w="12700" cap="flat" cmpd="sng" algn="ctr">
+                      <a:solidFill>
+                        <a:schemeClr val="tx1"/>
+                      </a:solidFill>
+                      <a:prstDash val="solid"/>
+                      <a:round/>
+                      <a:headEnd type="none" w="med" len="med"/>
+                      <a:tailEnd type="none" w="med" len="med"/>
+                    </a:lnT>
+                    <a:lnB w="12700" cap="flat" cmpd="sng" algn="ctr">
+                      <a:solidFill>
+                        <a:schemeClr val="tx1"/>
+                      </a:solidFill>
+                      <a:prstDash val="solid"/>
+                      <a:round/>
+                      <a:headEnd type="none" w="med" len="med"/>
+                      <a:tailEnd type="none" w="med" len="med"/>
+                    </a:lnB>
+                    <a:noFill/>
+                  </a:tcPr>
+                </a:tc>
+                <a:tc>
+                  <a:txBody>
+                    <a:bodyPr/>
+                    <a:lstStyle/>
+                    <a:p>
+                      <a:pPr algn="ctr"/>
+                      <a:r>
+                        <a:rPr lang="en-US" altLang="zh-CN" sz="1200" b="1" i="0" dirty="0">
+                          <a:solidFill>
+                            <a:schemeClr val="tx1"/>
+                          </a:solidFill>
+                        </a:rPr>
+                        <a:t>maxPointer</a:t>
+                      </a:r>
+                      <a:endParaRPr lang="zh-CN" altLang="en-US" sz="1200" b="1" i="0" dirty="0">
+                        <a:solidFill>
+                          <a:schemeClr val="tx1"/>
+                        </a:solidFill>
+                      </a:endParaRPr>
+                    </a:p>
+                  </a:txBody>
+                  <a:tcPr anchor="ctr">
+                    <a:lnL w="12700" cap="flat" cmpd="sng" algn="ctr">
+                      <a:solidFill>
+                        <a:schemeClr val="tx1"/>
+                      </a:solidFill>
+                      <a:prstDash val="solid"/>
+                      <a:round/>
+                      <a:headEnd type="none" w="med" len="med"/>
+                      <a:tailEnd type="none" w="med" len="med"/>
+                    </a:lnL>
+                    <a:lnR w="12700" cap="flat" cmpd="sng" algn="ctr">
+                      <a:solidFill>
+                        <a:schemeClr val="tx1"/>
+                      </a:solidFill>
+                      <a:prstDash val="solid"/>
+                      <a:round/>
+                      <a:headEnd type="none" w="med" len="med"/>
+                      <a:tailEnd type="none" w="med" len="med"/>
+                    </a:lnR>
+                    <a:lnT w="12700" cap="flat" cmpd="sng" algn="ctr">
+                      <a:solidFill>
+                        <a:schemeClr val="tx1"/>
+                      </a:solidFill>
+                      <a:prstDash val="solid"/>
+                      <a:round/>
+                      <a:headEnd type="none" w="med" len="med"/>
+                      <a:tailEnd type="none" w="med" len="med"/>
+                    </a:lnT>
+                    <a:lnB w="12700" cap="flat" cmpd="sng" algn="ctr">
+                      <a:solidFill>
+                        <a:schemeClr val="tx1"/>
+                      </a:solidFill>
+                      <a:prstDash val="solid"/>
+                      <a:round/>
+                      <a:headEnd type="none" w="med" len="med"/>
+                      <a:tailEnd type="none" w="med" len="med"/>
+                    </a:lnB>
+                    <a:noFill/>
                   </a:tcPr>
                 </a:tc>
                 <a:tc>
@@ -15827,717 +15963,6 @@
           <a:chExt cx="0" cy="0"/>
         </a:xfrm>
       </p:grpSpPr>
-      <p:graphicFrame>
-        <p:nvGraphicFramePr>
-          <p:cNvPr id="4" name="表格 3">
-            <a:extLst>
-              <a:ext uri="{FF2B5EF4-FFF2-40B4-BE49-F238E27FC236}">
-                <a16:creationId xmlns:a16="http://schemas.microsoft.com/office/drawing/2014/main" id="{B97E5C79-F43F-0D48-BDF7-498700ADB191}"/>
-              </a:ext>
-            </a:extLst>
-          </p:cNvPr>
-          <p:cNvGraphicFramePr>
-            <a:graphicFrameLocks noGrp="1"/>
-          </p:cNvGraphicFramePr>
-          <p:nvPr>
-            <p:extLst>
-              <p:ext uri="{D42A27DB-BD31-4B8C-83A1-F6EECF244321}">
-                <p14:modId xmlns:p14="http://schemas.microsoft.com/office/powerpoint/2010/main" val="623006679"/>
-              </p:ext>
-            </p:extLst>
-          </p:nvPr>
-        </p:nvGraphicFramePr>
-        <p:xfrm>
-          <a:off x="882501" y="1451342"/>
-          <a:ext cx="10240927" cy="370840"/>
-        </p:xfrm>
-        <a:graphic>
-          <a:graphicData uri="http://schemas.openxmlformats.org/drawingml/2006/table">
-            <a:tbl>
-              <a:tblPr firstRow="1" bandRow="1">
-                <a:tableStyleId>{5C22544A-7EE6-4342-B048-85BDC9FD1C3A}</a:tableStyleId>
-              </a:tblPr>
-              <a:tblGrid>
-                <a:gridCol w="788245">
-                  <a:extLst>
-                    <a:ext uri="{9D8B030D-6E8A-4147-A177-3AD203B41FA5}">
-                      <a16:colId xmlns:a16="http://schemas.microsoft.com/office/drawing/2014/main" val="2278590028"/>
-                    </a:ext>
-                  </a:extLst>
-                </a:gridCol>
-                <a:gridCol w="910235">
-                  <a:extLst>
-                    <a:ext uri="{9D8B030D-6E8A-4147-A177-3AD203B41FA5}">
-                      <a16:colId xmlns:a16="http://schemas.microsoft.com/office/drawing/2014/main" val="2845361826"/>
-                    </a:ext>
-                  </a:extLst>
-                </a:gridCol>
-                <a:gridCol w="1041609">
-                  <a:extLst>
-                    <a:ext uri="{9D8B030D-6E8A-4147-A177-3AD203B41FA5}">
-                      <a16:colId xmlns:a16="http://schemas.microsoft.com/office/drawing/2014/main" val="2192670918"/>
-                    </a:ext>
-                  </a:extLst>
-                </a:gridCol>
-                <a:gridCol w="1041609">
-                  <a:extLst>
-                    <a:ext uri="{9D8B030D-6E8A-4147-A177-3AD203B41FA5}">
-                      <a16:colId xmlns:a16="http://schemas.microsoft.com/office/drawing/2014/main" val="912257723"/>
-                    </a:ext>
-                  </a:extLst>
-                </a:gridCol>
-                <a:gridCol w="1266822">
-                  <a:extLst>
-                    <a:ext uri="{9D8B030D-6E8A-4147-A177-3AD203B41FA5}">
-                      <a16:colId xmlns:a16="http://schemas.microsoft.com/office/drawing/2014/main" val="3005407063"/>
-                    </a:ext>
-                  </a:extLst>
-                </a:gridCol>
-                <a:gridCol w="1341892">
-                  <a:extLst>
-                    <a:ext uri="{9D8B030D-6E8A-4147-A177-3AD203B41FA5}">
-                      <a16:colId xmlns:a16="http://schemas.microsoft.com/office/drawing/2014/main" val="3113886429"/>
-                    </a:ext>
-                  </a:extLst>
-                </a:gridCol>
-                <a:gridCol w="1445115">
-                  <a:extLst>
-                    <a:ext uri="{9D8B030D-6E8A-4147-A177-3AD203B41FA5}">
-                      <a16:colId xmlns:a16="http://schemas.microsoft.com/office/drawing/2014/main" val="3208990766"/>
-                    </a:ext>
-                  </a:extLst>
-                </a:gridCol>
-                <a:gridCol w="1393534">
-                  <a:extLst>
-                    <a:ext uri="{9D8B030D-6E8A-4147-A177-3AD203B41FA5}">
-                      <a16:colId xmlns:a16="http://schemas.microsoft.com/office/drawing/2014/main" val="3517022100"/>
-                    </a:ext>
-                  </a:extLst>
-                </a:gridCol>
-                <a:gridCol w="1011866">
-                  <a:extLst>
-                    <a:ext uri="{9D8B030D-6E8A-4147-A177-3AD203B41FA5}">
-                      <a16:colId xmlns:a16="http://schemas.microsoft.com/office/drawing/2014/main" val="1094384035"/>
-                    </a:ext>
-                  </a:extLst>
-                </a:gridCol>
-              </a:tblGrid>
-              <a:tr h="370840">
-                <a:tc>
-                  <a:txBody>
-                    <a:bodyPr/>
-                    <a:lstStyle/>
-                    <a:p>
-                      <a:pPr algn="ctr"/>
-                      <a:r>
-                        <a:rPr lang="en-US" altLang="zh-CN" sz="1200" b="1" i="0" kern="1200" dirty="0">
-                          <a:solidFill>
-                            <a:schemeClr val="tx1"/>
-                          </a:solidFill>
-                          <a:effectLst/>
-                          <a:latin typeface="+mn-lt"/>
-                          <a:ea typeface="+mn-ea"/>
-                          <a:cs typeface="+mn-cs"/>
-                        </a:rPr>
-                        <a:t>Header</a:t>
-                      </a:r>
-                      <a:endParaRPr lang="zh-CN" altLang="en-US" sz="1200" b="1" i="0" dirty="0">
-                        <a:solidFill>
-                          <a:schemeClr val="tx1"/>
-                        </a:solidFill>
-                      </a:endParaRPr>
-                    </a:p>
-                  </a:txBody>
-                  <a:tcPr anchor="ctr">
-                    <a:lnL w="12700" cap="flat" cmpd="sng" algn="ctr">
-                      <a:solidFill>
-                        <a:schemeClr val="tx1"/>
-                      </a:solidFill>
-                      <a:prstDash val="solid"/>
-                      <a:round/>
-                      <a:headEnd type="none" w="med" len="med"/>
-                      <a:tailEnd type="none" w="med" len="med"/>
-                    </a:lnL>
-                    <a:lnR w="12700" cap="flat" cmpd="sng" algn="ctr">
-                      <a:solidFill>
-                        <a:schemeClr val="tx1"/>
-                      </a:solidFill>
-                      <a:prstDash val="solid"/>
-                      <a:round/>
-                      <a:headEnd type="none" w="med" len="med"/>
-                      <a:tailEnd type="none" w="med" len="med"/>
-                    </a:lnR>
-                    <a:lnT w="12700" cap="flat" cmpd="sng" algn="ctr">
-                      <a:solidFill>
-                        <a:schemeClr val="tx1"/>
-                      </a:solidFill>
-                      <a:prstDash val="solid"/>
-                      <a:round/>
-                      <a:headEnd type="none" w="med" len="med"/>
-                      <a:tailEnd type="none" w="med" len="med"/>
-                    </a:lnT>
-                    <a:lnB w="12700" cap="flat" cmpd="sng" algn="ctr">
-                      <a:solidFill>
-                        <a:schemeClr val="tx1"/>
-                      </a:solidFill>
-                      <a:prstDash val="solid"/>
-                      <a:round/>
-                      <a:headEnd type="none" w="med" len="med"/>
-                      <a:tailEnd type="none" w="med" len="med"/>
-                    </a:lnB>
-                    <a:lnTlToBr w="12700" cmpd="sng">
-                      <a:noFill/>
-                      <a:prstDash val="solid"/>
-                    </a:lnTlToBr>
-                    <a:lnBlToTr w="12700" cmpd="sng">
-                      <a:noFill/>
-                      <a:prstDash val="solid"/>
-                    </a:lnBlToTr>
-                    <a:solidFill>
-                      <a:srgbClr val="0070C0"/>
-                    </a:solidFill>
-                  </a:tcPr>
-                </a:tc>
-                <a:tc>
-                  <a:txBody>
-                    <a:bodyPr/>
-                    <a:lstStyle/>
-                    <a:p>
-                      <a:pPr algn="ctr"/>
-                      <a:r>
-                        <a:rPr lang="en-US" altLang="zh-CN" sz="1200" b="1" i="0" kern="1200" dirty="0">
-                          <a:solidFill>
-                            <a:schemeClr val="tx1"/>
-                          </a:solidFill>
-                          <a:effectLst/>
-                          <a:latin typeface="+mn-lt"/>
-                          <a:ea typeface="+mn-ea"/>
-                          <a:cs typeface="+mn-cs"/>
-                        </a:rPr>
-                        <a:t>NumDocs</a:t>
-                      </a:r>
-                      <a:endParaRPr lang="zh-CN" altLang="en-US" sz="1200" b="0" i="0" dirty="0">
-                        <a:solidFill>
-                          <a:schemeClr val="tx1"/>
-                        </a:solidFill>
-                      </a:endParaRPr>
-                    </a:p>
-                  </a:txBody>
-                  <a:tcPr anchor="ctr">
-                    <a:lnL w="12700" cap="flat" cmpd="sng" algn="ctr">
-                      <a:solidFill>
-                        <a:schemeClr val="tx1"/>
-                      </a:solidFill>
-                      <a:prstDash val="solid"/>
-                      <a:round/>
-                      <a:headEnd type="none" w="med" len="med"/>
-                      <a:tailEnd type="none" w="med" len="med"/>
-                    </a:lnL>
-                    <a:lnR w="12700" cap="flat" cmpd="sng" algn="ctr">
-                      <a:solidFill>
-                        <a:schemeClr val="tx1"/>
-                      </a:solidFill>
-                      <a:prstDash val="solid"/>
-                      <a:round/>
-                      <a:headEnd type="none" w="med" len="med"/>
-                      <a:tailEnd type="none" w="med" len="med"/>
-                    </a:lnR>
-                    <a:lnT w="12700" cap="flat" cmpd="sng" algn="ctr">
-                      <a:solidFill>
-                        <a:schemeClr val="tx1"/>
-                      </a:solidFill>
-                      <a:prstDash val="solid"/>
-                      <a:round/>
-                      <a:headEnd type="none" w="med" len="med"/>
-                      <a:tailEnd type="none" w="med" len="med"/>
-                    </a:lnT>
-                    <a:lnB w="12700" cap="flat" cmpd="sng" algn="ctr">
-                      <a:solidFill>
-                        <a:schemeClr val="tx1"/>
-                      </a:solidFill>
-                      <a:prstDash val="solid"/>
-                      <a:round/>
-                      <a:headEnd type="none" w="med" len="med"/>
-                      <a:tailEnd type="none" w="med" len="med"/>
-                    </a:lnB>
-                    <a:solidFill>
-                      <a:schemeClr val="bg1"/>
-                    </a:solidFill>
-                  </a:tcPr>
-                </a:tc>
-                <a:tc>
-                  <a:txBody>
-                    <a:bodyPr/>
-                    <a:lstStyle/>
-                    <a:p>
-                      <a:pPr algn="ctr"/>
-                      <a:r>
-                        <a:rPr lang="en-US" altLang="zh-CN" sz="1200" b="1" i="0" kern="1200" dirty="0">
-                          <a:solidFill>
-                            <a:schemeClr val="tx1"/>
-                          </a:solidFill>
-                          <a:effectLst/>
-                          <a:latin typeface="+mn-lt"/>
-                          <a:ea typeface="+mn-ea"/>
-                          <a:cs typeface="+mn-cs"/>
-                        </a:rPr>
-                        <a:t>BlockShift</a:t>
-                      </a:r>
-                      <a:endParaRPr lang="zh-CN" altLang="en-US" sz="1200" b="0" i="0" dirty="0">
-                        <a:solidFill>
-                          <a:schemeClr val="tx1"/>
-                        </a:solidFill>
-                      </a:endParaRPr>
-                    </a:p>
-                  </a:txBody>
-                  <a:tcPr anchor="ctr">
-                    <a:lnL w="12700" cap="flat" cmpd="sng" algn="ctr">
-                      <a:solidFill>
-                        <a:schemeClr val="tx1"/>
-                      </a:solidFill>
-                      <a:prstDash val="solid"/>
-                      <a:round/>
-                      <a:headEnd type="none" w="med" len="med"/>
-                      <a:tailEnd type="none" w="med" len="med"/>
-                    </a:lnL>
-                    <a:lnR w="12700" cap="flat" cmpd="sng" algn="ctr">
-                      <a:solidFill>
-                        <a:schemeClr val="tx1"/>
-                      </a:solidFill>
-                      <a:prstDash val="solid"/>
-                      <a:round/>
-                      <a:headEnd type="none" w="med" len="med"/>
-                      <a:tailEnd type="none" w="med" len="med"/>
-                    </a:lnR>
-                    <a:lnT w="12700" cap="flat" cmpd="sng" algn="ctr">
-                      <a:solidFill>
-                        <a:schemeClr val="tx1"/>
-                      </a:solidFill>
-                      <a:prstDash val="solid"/>
-                      <a:round/>
-                      <a:headEnd type="none" w="med" len="med"/>
-                      <a:tailEnd type="none" w="med" len="med"/>
-                    </a:lnT>
-                    <a:lnB w="12700" cap="flat" cmpd="sng" algn="ctr">
-                      <a:solidFill>
-                        <a:schemeClr val="tx1"/>
-                      </a:solidFill>
-                      <a:prstDash val="solid"/>
-                      <a:round/>
-                      <a:headEnd type="none" w="med" len="med"/>
-                      <a:tailEnd type="none" w="med" len="med"/>
-                    </a:lnB>
-                    <a:solidFill>
-                      <a:schemeClr val="bg1"/>
-                    </a:solidFill>
-                  </a:tcPr>
-                </a:tc>
-                <a:tc>
-                  <a:txBody>
-                    <a:bodyPr/>
-                    <a:lstStyle/>
-                    <a:p>
-                      <a:pPr algn="ctr"/>
-                      <a:r>
-                        <a:rPr lang="en-US" altLang="zh-CN" sz="1200" b="1" i="0" dirty="0">
-                          <a:solidFill>
-                            <a:schemeClr val="tx1"/>
-                          </a:solidFill>
-                        </a:rPr>
-                        <a:t>TotalChunks</a:t>
-                      </a:r>
-                      <a:endParaRPr lang="zh-CN" altLang="en-US" sz="1200" b="1" i="0" dirty="0">
-                        <a:solidFill>
-                          <a:schemeClr val="tx1"/>
-                        </a:solidFill>
-                      </a:endParaRPr>
-                    </a:p>
-                  </a:txBody>
-                  <a:tcPr anchor="ctr">
-                    <a:lnL w="12700" cap="flat" cmpd="sng" algn="ctr">
-                      <a:solidFill>
-                        <a:schemeClr val="tx1"/>
-                      </a:solidFill>
-                      <a:prstDash val="solid"/>
-                      <a:round/>
-                      <a:headEnd type="none" w="med" len="med"/>
-                      <a:tailEnd type="none" w="med" len="med"/>
-                    </a:lnL>
-                    <a:lnR w="12700" cap="flat" cmpd="sng" algn="ctr">
-                      <a:solidFill>
-                        <a:schemeClr val="tx1"/>
-                      </a:solidFill>
-                      <a:prstDash val="solid"/>
-                      <a:round/>
-                      <a:headEnd type="none" w="med" len="med"/>
-                      <a:tailEnd type="none" w="med" len="med"/>
-                    </a:lnR>
-                    <a:lnT w="12700" cap="flat" cmpd="sng" algn="ctr">
-                      <a:solidFill>
-                        <a:schemeClr val="tx1"/>
-                      </a:solidFill>
-                      <a:prstDash val="solid"/>
-                      <a:round/>
-                      <a:headEnd type="none" w="med" len="med"/>
-                      <a:tailEnd type="none" w="med" len="med"/>
-                    </a:lnT>
-                    <a:lnB w="12700" cap="flat" cmpd="sng" algn="ctr">
-                      <a:solidFill>
-                        <a:schemeClr val="tx1"/>
-                      </a:solidFill>
-                      <a:prstDash val="solid"/>
-                      <a:round/>
-                      <a:headEnd type="none" w="med" len="med"/>
-                      <a:tailEnd type="none" w="med" len="med"/>
-                    </a:lnB>
-                    <a:solidFill>
-                      <a:schemeClr val="bg1">
-                        <a:lumMod val="95000"/>
-                      </a:schemeClr>
-                    </a:solidFill>
-                  </a:tcPr>
-                </a:tc>
-                <a:tc>
-                  <a:txBody>
-                    <a:bodyPr/>
-                    <a:lstStyle/>
-                    <a:p>
-                      <a:pPr algn="ctr"/>
-                      <a:r>
-                        <a:rPr lang="en-US" altLang="zh-CN" sz="1200" b="1" i="0" dirty="0">
-                          <a:solidFill>
-                            <a:schemeClr val="tx1"/>
-                          </a:solidFill>
-                        </a:rPr>
-                        <a:t>NumDocsIndex</a:t>
-                      </a:r>
-                      <a:endParaRPr lang="zh-CN" altLang="en-US" sz="1200" b="0" i="0" dirty="0">
-                        <a:solidFill>
-                          <a:schemeClr val="tx1"/>
-                        </a:solidFill>
-                      </a:endParaRPr>
-                    </a:p>
-                  </a:txBody>
-                  <a:tcPr anchor="ctr">
-                    <a:lnL w="12700" cap="flat" cmpd="sng" algn="ctr">
-                      <a:solidFill>
-                        <a:schemeClr val="tx1"/>
-                      </a:solidFill>
-                      <a:prstDash val="solid"/>
-                      <a:round/>
-                      <a:headEnd type="none" w="med" len="med"/>
-                      <a:tailEnd type="none" w="med" len="med"/>
-                    </a:lnL>
-                    <a:lnR w="12700" cap="flat" cmpd="sng" algn="ctr">
-                      <a:solidFill>
-                        <a:schemeClr val="tx1"/>
-                      </a:solidFill>
-                      <a:prstDash val="solid"/>
-                      <a:round/>
-                      <a:headEnd type="none" w="med" len="med"/>
-                      <a:tailEnd type="none" w="med" len="med"/>
-                    </a:lnR>
-                    <a:lnT w="12700" cap="flat" cmpd="sng" algn="ctr">
-                      <a:solidFill>
-                        <a:schemeClr val="tx1"/>
-                      </a:solidFill>
-                      <a:prstDash val="solid"/>
-                      <a:round/>
-                      <a:headEnd type="none" w="med" len="med"/>
-                      <a:tailEnd type="none" w="med" len="med"/>
-                    </a:lnT>
-                    <a:lnB w="12700" cap="flat" cmpd="sng" algn="ctr">
-                      <a:solidFill>
-                        <a:schemeClr val="tx1"/>
-                      </a:solidFill>
-                      <a:prstDash val="solid"/>
-                      <a:round/>
-                      <a:headEnd type="none" w="med" len="med"/>
-                      <a:tailEnd type="none" w="med" len="med"/>
-                    </a:lnB>
-                    <a:solidFill>
-                      <a:schemeClr val="bg1"/>
-                    </a:solidFill>
-                  </a:tcPr>
-                </a:tc>
-                <a:tc>
-                  <a:txBody>
-                    <a:bodyPr/>
-                    <a:lstStyle/>
-                    <a:p>
-                      <a:pPr algn="ctr"/>
-                      <a:r>
-                        <a:rPr lang="en-US" altLang="zh-CN" sz="1200" b="1" i="0" dirty="0">
-                          <a:solidFill>
-                            <a:schemeClr val="tx1"/>
-                          </a:solidFill>
-                        </a:rPr>
-                        <a:t>NumDocsMeta</a:t>
-                      </a:r>
-                      <a:endParaRPr lang="zh-CN" altLang="en-US" sz="1200" b="0" i="0" dirty="0">
-                        <a:solidFill>
-                          <a:schemeClr val="tx1"/>
-                        </a:solidFill>
-                      </a:endParaRPr>
-                    </a:p>
-                  </a:txBody>
-                  <a:tcPr anchor="ctr">
-                    <a:lnL w="12700" cap="flat" cmpd="sng" algn="ctr">
-                      <a:solidFill>
-                        <a:schemeClr val="tx1"/>
-                      </a:solidFill>
-                      <a:prstDash val="solid"/>
-                      <a:round/>
-                      <a:headEnd type="none" w="med" len="med"/>
-                      <a:tailEnd type="none" w="med" len="med"/>
-                    </a:lnL>
-                    <a:lnR w="12700" cap="flat" cmpd="sng" algn="ctr">
-                      <a:solidFill>
-                        <a:schemeClr val="tx1"/>
-                      </a:solidFill>
-                      <a:prstDash val="solid"/>
-                      <a:round/>
-                      <a:headEnd type="none" w="med" len="med"/>
-                      <a:tailEnd type="none" w="med" len="med"/>
-                    </a:lnR>
-                    <a:lnT w="12700" cap="flat" cmpd="sng" algn="ctr">
-                      <a:solidFill>
-                        <a:schemeClr val="tx1"/>
-                      </a:solidFill>
-                      <a:prstDash val="solid"/>
-                      <a:round/>
-                      <a:headEnd type="none" w="med" len="med"/>
-                      <a:tailEnd type="none" w="med" len="med"/>
-                    </a:lnT>
-                    <a:lnB w="12700" cap="flat" cmpd="sng" algn="ctr">
-                      <a:solidFill>
-                        <a:schemeClr val="tx1"/>
-                      </a:solidFill>
-                      <a:prstDash val="solid"/>
-                      <a:round/>
-                      <a:headEnd type="none" w="med" len="med"/>
-                      <a:tailEnd type="none" w="med" len="med"/>
-                    </a:lnB>
-                    <a:solidFill>
-                      <a:schemeClr val="tx2">
-                        <a:lumMod val="60000"/>
-                        <a:lumOff val="40000"/>
-                      </a:schemeClr>
-                    </a:solidFill>
-                  </a:tcPr>
-                </a:tc>
-                <a:tc>
-                  <a:txBody>
-                    <a:bodyPr/>
-                    <a:lstStyle/>
-                    <a:p>
-                      <a:pPr algn="ctr"/>
-                      <a:r>
-                        <a:rPr lang="en-US" altLang="zh-CN" sz="1200" b="1" i="0" kern="1200" dirty="0">
-                          <a:solidFill>
-                            <a:schemeClr val="tx1"/>
-                          </a:solidFill>
-                          <a:effectLst/>
-                          <a:latin typeface="+mn-lt"/>
-                          <a:ea typeface="+mn-ea"/>
-                          <a:cs typeface="+mn-cs"/>
-                        </a:rPr>
-                        <a:t>StartPointsIndex</a:t>
-                      </a:r>
-                      <a:endParaRPr lang="zh-CN" altLang="en-US" sz="1200" b="0" i="0" dirty="0">
-                        <a:solidFill>
-                          <a:schemeClr val="tx1"/>
-                        </a:solidFill>
-                      </a:endParaRPr>
-                    </a:p>
-                  </a:txBody>
-                  <a:tcPr anchor="ctr">
-                    <a:lnL w="12700" cap="flat" cmpd="sng" algn="ctr">
-                      <a:solidFill>
-                        <a:schemeClr val="tx1"/>
-                      </a:solidFill>
-                      <a:prstDash val="solid"/>
-                      <a:round/>
-                      <a:headEnd type="none" w="med" len="med"/>
-                      <a:tailEnd type="none" w="med" len="med"/>
-                    </a:lnL>
-                    <a:lnR w="12700" cap="flat" cmpd="sng" algn="ctr">
-                      <a:solidFill>
-                        <a:schemeClr val="tx1"/>
-                      </a:solidFill>
-                      <a:prstDash val="solid"/>
-                      <a:round/>
-                      <a:headEnd type="none" w="med" len="med"/>
-                      <a:tailEnd type="none" w="med" len="med"/>
-                    </a:lnR>
-                    <a:lnT w="12700" cap="flat" cmpd="sng" algn="ctr">
-                      <a:solidFill>
-                        <a:schemeClr val="tx1"/>
-                      </a:solidFill>
-                      <a:prstDash val="solid"/>
-                      <a:round/>
-                      <a:headEnd type="none" w="med" len="med"/>
-                      <a:tailEnd type="none" w="med" len="med"/>
-                    </a:lnT>
-                    <a:lnB w="12700" cap="flat" cmpd="sng" algn="ctr">
-                      <a:solidFill>
-                        <a:schemeClr val="tx1"/>
-                      </a:solidFill>
-                      <a:prstDash val="solid"/>
-                      <a:round/>
-                      <a:headEnd type="none" w="med" len="med"/>
-                      <a:tailEnd type="none" w="med" len="med"/>
-                    </a:lnB>
-                    <a:solidFill>
-                      <a:schemeClr val="bg1">
-                        <a:lumMod val="95000"/>
-                      </a:schemeClr>
-                    </a:solidFill>
-                  </a:tcPr>
-                </a:tc>
-                <a:tc>
-                  <a:txBody>
-                    <a:bodyPr/>
-                    <a:lstStyle/>
-                    <a:p>
-                      <a:pPr algn="ctr"/>
-                      <a:r>
-                        <a:rPr lang="en-US" altLang="zh-CN" sz="1200" b="1" i="0" kern="1200" dirty="0">
-                          <a:solidFill>
-                            <a:schemeClr val="tx1"/>
-                          </a:solidFill>
-                          <a:effectLst/>
-                          <a:latin typeface="+mn-lt"/>
-                          <a:ea typeface="+mn-ea"/>
-                          <a:cs typeface="+mn-cs"/>
-                        </a:rPr>
-                        <a:t>StartPointsMeta</a:t>
-                      </a:r>
-                      <a:endParaRPr lang="zh-CN" altLang="en-US" sz="1200" b="0" i="0" dirty="0">
-                        <a:solidFill>
-                          <a:schemeClr val="tx1"/>
-                        </a:solidFill>
-                      </a:endParaRPr>
-                    </a:p>
-                  </a:txBody>
-                  <a:tcPr anchor="ctr">
-                    <a:lnL w="12700" cap="flat" cmpd="sng" algn="ctr">
-                      <a:solidFill>
-                        <a:schemeClr val="tx1"/>
-                      </a:solidFill>
-                      <a:prstDash val="solid"/>
-                      <a:round/>
-                      <a:headEnd type="none" w="med" len="med"/>
-                      <a:tailEnd type="none" w="med" len="med"/>
-                    </a:lnL>
-                    <a:lnR w="12700" cap="flat" cmpd="sng" algn="ctr">
-                      <a:solidFill>
-                        <a:schemeClr val="tx1"/>
-                      </a:solidFill>
-                      <a:prstDash val="solid"/>
-                      <a:round/>
-                      <a:headEnd type="none" w="med" len="med"/>
-                      <a:tailEnd type="none" w="med" len="med"/>
-                    </a:lnR>
-                    <a:lnT w="12700" cap="flat" cmpd="sng" algn="ctr">
-                      <a:solidFill>
-                        <a:schemeClr val="tx1"/>
-                      </a:solidFill>
-                      <a:prstDash val="solid"/>
-                      <a:round/>
-                      <a:headEnd type="none" w="med" len="med"/>
-                      <a:tailEnd type="none" w="med" len="med"/>
-                    </a:lnT>
-                    <a:lnB w="12700" cap="flat" cmpd="sng" algn="ctr">
-                      <a:solidFill>
-                        <a:schemeClr val="tx1"/>
-                      </a:solidFill>
-                      <a:prstDash val="solid"/>
-                      <a:round/>
-                      <a:headEnd type="none" w="med" len="med"/>
-                      <a:tailEnd type="none" w="med" len="med"/>
-                    </a:lnB>
-                    <a:solidFill>
-                      <a:schemeClr val="accent2">
-                        <a:lumMod val="60000"/>
-                        <a:lumOff val="40000"/>
-                      </a:schemeClr>
-                    </a:solidFill>
-                  </a:tcPr>
-                </a:tc>
-                <a:tc>
-                  <a:txBody>
-                    <a:bodyPr/>
-                    <a:lstStyle/>
-                    <a:p>
-                      <a:pPr algn="ctr"/>
-                      <a:r>
-                        <a:rPr lang="en-US" altLang="zh-CN" sz="1200" b="1" i="0" dirty="0">
-                          <a:solidFill>
-                            <a:schemeClr val="tx1"/>
-                          </a:solidFill>
-                        </a:rPr>
-                        <a:t>Footer</a:t>
-                      </a:r>
-                      <a:endParaRPr lang="zh-CN" altLang="en-US" sz="1200" b="1" i="0" dirty="0">
-                        <a:solidFill>
-                          <a:schemeClr val="tx1"/>
-                        </a:solidFill>
-                      </a:endParaRPr>
-                    </a:p>
-                  </a:txBody>
-                  <a:tcPr anchor="ctr">
-                    <a:lnL w="12700" cap="flat" cmpd="sng" algn="ctr">
-                      <a:solidFill>
-                        <a:schemeClr val="tx1"/>
-                      </a:solidFill>
-                      <a:prstDash val="solid"/>
-                      <a:round/>
-                      <a:headEnd type="none" w="med" len="med"/>
-                      <a:tailEnd type="none" w="med" len="med"/>
-                    </a:lnL>
-                    <a:lnR w="12700" cap="flat" cmpd="sng" algn="ctr">
-                      <a:solidFill>
-                        <a:schemeClr val="tx1"/>
-                      </a:solidFill>
-                      <a:prstDash val="solid"/>
-                      <a:round/>
-                      <a:headEnd type="none" w="med" len="med"/>
-                      <a:tailEnd type="none" w="med" len="med"/>
-                    </a:lnR>
-                    <a:lnT w="12700" cap="flat" cmpd="sng" algn="ctr">
-                      <a:solidFill>
-                        <a:schemeClr val="tx1"/>
-                      </a:solidFill>
-                      <a:prstDash val="solid"/>
-                      <a:round/>
-                      <a:headEnd type="none" w="med" len="med"/>
-                      <a:tailEnd type="none" w="med" len="med"/>
-                    </a:lnT>
-                    <a:lnB w="12700" cap="flat" cmpd="sng" algn="ctr">
-                      <a:solidFill>
-                        <a:schemeClr val="tx1"/>
-                      </a:solidFill>
-                      <a:prstDash val="solid"/>
-                      <a:round/>
-                      <a:headEnd type="none" w="med" len="med"/>
-                      <a:tailEnd type="none" w="med" len="med"/>
-                    </a:lnB>
-                    <a:solidFill>
-                      <a:srgbClr val="7030A0"/>
-                    </a:solidFill>
-                  </a:tcPr>
-                </a:tc>
-                <a:extLst>
-                  <a:ext uri="{0D108BD9-81ED-4DB2-BD59-A6C34878D82A}">
-                    <a16:rowId xmlns:a16="http://schemas.microsoft.com/office/drawing/2014/main" val="1027363210"/>
-                  </a:ext>
-                </a:extLst>
-              </a:tr>
-            </a:tbl>
-          </a:graphicData>
-        </a:graphic>
-      </p:graphicFrame>
       <p:sp>
         <p:nvSpPr>
           <p:cNvPr id="5" name="文本框 4">
@@ -16552,7 +15977,7 @@
         </p:nvSpPr>
         <p:spPr>
           <a:xfrm>
-            <a:off x="5591633" y="322675"/>
+            <a:off x="5510610" y="345824"/>
             <a:ext cx="822661" cy="461665"/>
           </a:xfrm>
           <a:prstGeom prst="rect">
@@ -16585,14 +16010,13 @@
           </p:cNvPr>
           <p:cNvCxnSpPr>
             <a:cxnSpLocks/>
-            <a:stCxn id="4" idx="2"/>
           </p:cNvCxnSpPr>
           <p:nvPr/>
         </p:nvCxnSpPr>
         <p:spPr>
           <a:xfrm flipH="1">
-            <a:off x="2546342" y="1822182"/>
-            <a:ext cx="3456622" cy="812918"/>
+            <a:off x="2465319" y="1845198"/>
+            <a:ext cx="2500842" cy="813051"/>
           </a:xfrm>
           <a:prstGeom prst="line">
             <a:avLst/>
@@ -16628,9 +16052,9 @@
           <p:nvPr/>
         </p:nvCxnSpPr>
         <p:spPr>
-          <a:xfrm flipH="1">
-            <a:off x="6960065" y="1836361"/>
-            <a:ext cx="301972" cy="798739"/>
+          <a:xfrm>
+            <a:off x="6319110" y="1845198"/>
+            <a:ext cx="559932" cy="813051"/>
           </a:xfrm>
           <a:prstGeom prst="line">
             <a:avLst/>
@@ -16666,13 +16090,13 @@
           <p:nvPr>
             <p:extLst>
               <p:ext uri="{D42A27DB-BD31-4B8C-83A1-F6EECF244321}">
-                <p14:modId xmlns:p14="http://schemas.microsoft.com/office/powerpoint/2010/main" val="4148271568"/>
+                <p14:modId xmlns:p14="http://schemas.microsoft.com/office/powerpoint/2010/main" val="2184524203"/>
               </p:ext>
             </p:extLst>
           </p:nvPr>
         </p:nvGraphicFramePr>
         <p:xfrm>
-          <a:off x="7398038" y="2635100"/>
+          <a:off x="7317015" y="2658249"/>
           <a:ext cx="2500842" cy="370840"/>
         </p:xfrm>
         <a:graphic>
@@ -16863,13 +16287,13 @@
           <p:nvPr>
             <p:extLst>
               <p:ext uri="{D42A27DB-BD31-4B8C-83A1-F6EECF244321}">
-                <p14:modId xmlns:p14="http://schemas.microsoft.com/office/powerpoint/2010/main" val="2955695391"/>
+                <p14:modId xmlns:p14="http://schemas.microsoft.com/office/powerpoint/2010/main" val="3680936027"/>
               </p:ext>
             </p:extLst>
           </p:nvPr>
         </p:nvGraphicFramePr>
         <p:xfrm>
-          <a:off x="10469870" y="2635100"/>
+          <a:off x="10388847" y="2658249"/>
           <a:ext cx="1341892" cy="370840"/>
         </p:xfrm>
         <a:graphic>
@@ -16982,7 +16406,7 @@
         </p:nvSpPr>
         <p:spPr>
           <a:xfrm>
-            <a:off x="9898880" y="2636608"/>
+            <a:off x="9817857" y="2659757"/>
             <a:ext cx="570990" cy="369332"/>
           </a:xfrm>
           <a:prstGeom prst="rect">
@@ -17028,8 +16452,8 @@
         </p:nvCxnSpPr>
         <p:spPr>
           <a:xfrm flipH="1">
-            <a:off x="7398039" y="1836361"/>
-            <a:ext cx="1331291" cy="798739"/>
+            <a:off x="7317017" y="1852287"/>
+            <a:ext cx="365787" cy="805962"/>
           </a:xfrm>
           <a:prstGeom prst="line">
             <a:avLst/>
@@ -17066,8 +16490,8 @@
         </p:nvCxnSpPr>
         <p:spPr>
           <a:xfrm>
-            <a:off x="10122195" y="1836361"/>
-            <a:ext cx="1689567" cy="798739"/>
+            <a:off x="9040987" y="1845198"/>
+            <a:ext cx="2689752" cy="813051"/>
           </a:xfrm>
           <a:prstGeom prst="line">
             <a:avLst/>
@@ -17103,13 +16527,13 @@
           <p:nvPr>
             <p:extLst>
               <p:ext uri="{D42A27DB-BD31-4B8C-83A1-F6EECF244321}">
-                <p14:modId xmlns:p14="http://schemas.microsoft.com/office/powerpoint/2010/main" val="701241686"/>
+                <p14:modId xmlns:p14="http://schemas.microsoft.com/office/powerpoint/2010/main" val="1734659233"/>
               </p:ext>
             </p:extLst>
           </p:nvPr>
         </p:nvGraphicFramePr>
         <p:xfrm>
-          <a:off x="7044768" y="3673549"/>
+          <a:off x="6963745" y="3696698"/>
           <a:ext cx="4154484" cy="370840"/>
         </p:xfrm>
         <a:graphic>
@@ -17427,7 +16851,7 @@
         </p:nvCxnSpPr>
         <p:spPr>
           <a:xfrm flipH="1">
-            <a:off x="7044768" y="3020119"/>
+            <a:off x="6963745" y="3043268"/>
             <a:ext cx="1603691" cy="653430"/>
           </a:xfrm>
           <a:prstGeom prst="line">
@@ -17465,7 +16889,7 @@
         </p:nvCxnSpPr>
         <p:spPr>
           <a:xfrm>
-            <a:off x="9898880" y="3020119"/>
+            <a:off x="9817857" y="3043268"/>
             <a:ext cx="1300372" cy="639251"/>
           </a:xfrm>
           <a:prstGeom prst="line">
@@ -17502,13 +16926,13 @@
           <p:nvPr>
             <p:extLst>
               <p:ext uri="{D42A27DB-BD31-4B8C-83A1-F6EECF244321}">
-                <p14:modId xmlns:p14="http://schemas.microsoft.com/office/powerpoint/2010/main" val="668778738"/>
+                <p14:modId xmlns:p14="http://schemas.microsoft.com/office/powerpoint/2010/main" val="1206444192"/>
               </p:ext>
             </p:extLst>
           </p:nvPr>
         </p:nvGraphicFramePr>
         <p:xfrm>
-          <a:off x="2546342" y="2647505"/>
+          <a:off x="2465319" y="2670654"/>
           <a:ext cx="2500842" cy="370840"/>
         </p:xfrm>
         <a:graphic>
@@ -17691,13 +17115,13 @@
           <p:nvPr>
             <p:extLst>
               <p:ext uri="{D42A27DB-BD31-4B8C-83A1-F6EECF244321}">
-                <p14:modId xmlns:p14="http://schemas.microsoft.com/office/powerpoint/2010/main" val="2295939699"/>
+                <p14:modId xmlns:p14="http://schemas.microsoft.com/office/powerpoint/2010/main" val="437885928"/>
               </p:ext>
             </p:extLst>
           </p:nvPr>
         </p:nvGraphicFramePr>
         <p:xfrm>
-          <a:off x="5618174" y="2647505"/>
+          <a:off x="5537151" y="2670654"/>
           <a:ext cx="1341892" cy="370840"/>
         </p:xfrm>
         <a:graphic>
@@ -17806,7 +17230,7 @@
         </p:nvSpPr>
         <p:spPr>
           <a:xfrm>
-            <a:off x="5047184" y="2649013"/>
+            <a:off x="4966161" y="2672162"/>
             <a:ext cx="570990" cy="369332"/>
           </a:xfrm>
           <a:prstGeom prst="rect">
@@ -17851,13 +17275,13 @@
           <p:nvPr>
             <p:extLst>
               <p:ext uri="{D42A27DB-BD31-4B8C-83A1-F6EECF244321}">
-                <p14:modId xmlns:p14="http://schemas.microsoft.com/office/powerpoint/2010/main" val="2702089141"/>
+                <p14:modId xmlns:p14="http://schemas.microsoft.com/office/powerpoint/2010/main" val="3593982492"/>
               </p:ext>
             </p:extLst>
           </p:nvPr>
         </p:nvGraphicFramePr>
         <p:xfrm>
-          <a:off x="2193072" y="3685954"/>
+          <a:off x="2112049" y="3709103"/>
           <a:ext cx="4154484" cy="370840"/>
         </p:xfrm>
         <a:graphic>
@@ -18175,7 +17599,7 @@
         </p:nvCxnSpPr>
         <p:spPr>
           <a:xfrm flipH="1">
-            <a:off x="2193072" y="3032524"/>
+            <a:off x="2112049" y="3055673"/>
             <a:ext cx="1603691" cy="653430"/>
           </a:xfrm>
           <a:prstGeom prst="line">
@@ -18213,7 +17637,7 @@
         </p:nvCxnSpPr>
         <p:spPr>
           <a:xfrm>
-            <a:off x="5047184" y="3032524"/>
+            <a:off x="4966161" y="3055673"/>
             <a:ext cx="1300372" cy="639251"/>
           </a:xfrm>
           <a:prstGeom prst="line">
@@ -18235,6 +17659,853 @@
           </a:fontRef>
         </p:style>
       </p:cxnSp>
+      <p:graphicFrame>
+        <p:nvGraphicFramePr>
+          <p:cNvPr id="21" name="表格 20">
+            <a:extLst>
+              <a:ext uri="{FF2B5EF4-FFF2-40B4-BE49-F238E27FC236}">
+                <a16:creationId xmlns:a16="http://schemas.microsoft.com/office/drawing/2014/main" id="{98795032-B5F5-7149-BEE8-9272C75AB2B3}"/>
+              </a:ext>
+            </a:extLst>
+          </p:cNvPr>
+          <p:cNvGraphicFramePr>
+            <a:graphicFrameLocks noGrp="1"/>
+          </p:cNvGraphicFramePr>
+          <p:nvPr>
+            <p:extLst>
+              <p:ext uri="{D42A27DB-BD31-4B8C-83A1-F6EECF244321}">
+                <p14:modId xmlns:p14="http://schemas.microsoft.com/office/powerpoint/2010/main" val="2175342811"/>
+              </p:ext>
+            </p:extLst>
+          </p:nvPr>
+        </p:nvGraphicFramePr>
+        <p:xfrm>
+          <a:off x="131178" y="1460312"/>
+          <a:ext cx="11979799" cy="370840"/>
+        </p:xfrm>
+        <a:graphic>
+          <a:graphicData uri="http://schemas.openxmlformats.org/drawingml/2006/table">
+            <a:tbl>
+              <a:tblPr firstRow="1" bandRow="1">
+                <a:tableStyleId>{5C22544A-7EE6-4342-B048-85BDC9FD1C3A}</a:tableStyleId>
+              </a:tblPr>
+              <a:tblGrid>
+                <a:gridCol w="717631">
+                  <a:extLst>
+                    <a:ext uri="{9D8B030D-6E8A-4147-A177-3AD203B41FA5}">
+                      <a16:colId xmlns:a16="http://schemas.microsoft.com/office/drawing/2014/main" val="2278590028"/>
+                    </a:ext>
+                  </a:extLst>
+                </a:gridCol>
+                <a:gridCol w="914400">
+                  <a:extLst>
+                    <a:ext uri="{9D8B030D-6E8A-4147-A177-3AD203B41FA5}">
+                      <a16:colId xmlns:a16="http://schemas.microsoft.com/office/drawing/2014/main" val="2845361826"/>
+                    </a:ext>
+                  </a:extLst>
+                </a:gridCol>
+                <a:gridCol w="887600">
+                  <a:extLst>
+                    <a:ext uri="{9D8B030D-6E8A-4147-A177-3AD203B41FA5}">
+                      <a16:colId xmlns:a16="http://schemas.microsoft.com/office/drawing/2014/main" val="2192670918"/>
+                    </a:ext>
+                  </a:extLst>
+                </a:gridCol>
+                <a:gridCol w="1045372">
+                  <a:extLst>
+                    <a:ext uri="{9D8B030D-6E8A-4147-A177-3AD203B41FA5}">
+                      <a16:colId xmlns:a16="http://schemas.microsoft.com/office/drawing/2014/main" val="912257723"/>
+                    </a:ext>
+                  </a:extLst>
+                </a:gridCol>
+                <a:gridCol w="1284790">
+                  <a:extLst>
+                    <a:ext uri="{9D8B030D-6E8A-4147-A177-3AD203B41FA5}">
+                      <a16:colId xmlns:a16="http://schemas.microsoft.com/office/drawing/2014/main" val="3005407063"/>
+                    </a:ext>
+                  </a:extLst>
+                </a:gridCol>
+                <a:gridCol w="1307939">
+                  <a:extLst>
+                    <a:ext uri="{9D8B030D-6E8A-4147-A177-3AD203B41FA5}">
+                      <a16:colId xmlns:a16="http://schemas.microsoft.com/office/drawing/2014/main" val="3113886429"/>
+                    </a:ext>
+                  </a:extLst>
+                </a:gridCol>
+                <a:gridCol w="1365813">
+                  <a:extLst>
+                    <a:ext uri="{9D8B030D-6E8A-4147-A177-3AD203B41FA5}">
+                      <a16:colId xmlns:a16="http://schemas.microsoft.com/office/drawing/2014/main" val="3208990766"/>
+                    </a:ext>
+                  </a:extLst>
+                </a:gridCol>
+                <a:gridCol w="1400536">
+                  <a:extLst>
+                    <a:ext uri="{9D8B030D-6E8A-4147-A177-3AD203B41FA5}">
+                      <a16:colId xmlns:a16="http://schemas.microsoft.com/office/drawing/2014/main" val="3517022100"/>
+                    </a:ext>
+                  </a:extLst>
+                </a:gridCol>
+                <a:gridCol w="1296365">
+                  <a:extLst>
+                    <a:ext uri="{9D8B030D-6E8A-4147-A177-3AD203B41FA5}">
+                      <a16:colId xmlns:a16="http://schemas.microsoft.com/office/drawing/2014/main" val="1446665914"/>
+                    </a:ext>
+                  </a:extLst>
+                </a:gridCol>
+                <a:gridCol w="1030147">
+                  <a:extLst>
+                    <a:ext uri="{9D8B030D-6E8A-4147-A177-3AD203B41FA5}">
+                      <a16:colId xmlns:a16="http://schemas.microsoft.com/office/drawing/2014/main" val="1340333125"/>
+                    </a:ext>
+                  </a:extLst>
+                </a:gridCol>
+                <a:gridCol w="729206">
+                  <a:extLst>
+                    <a:ext uri="{9D8B030D-6E8A-4147-A177-3AD203B41FA5}">
+                      <a16:colId xmlns:a16="http://schemas.microsoft.com/office/drawing/2014/main" val="1094384035"/>
+                    </a:ext>
+                  </a:extLst>
+                </a:gridCol>
+              </a:tblGrid>
+              <a:tr h="370840">
+                <a:tc>
+                  <a:txBody>
+                    <a:bodyPr/>
+                    <a:lstStyle/>
+                    <a:p>
+                      <a:pPr algn="ctr"/>
+                      <a:r>
+                        <a:rPr lang="en-US" altLang="zh-CN" sz="1200" b="1" i="0" kern="1200" dirty="0">
+                          <a:solidFill>
+                            <a:schemeClr val="tx1"/>
+                          </a:solidFill>
+                          <a:effectLst/>
+                          <a:latin typeface="+mn-lt"/>
+                          <a:ea typeface="+mn-ea"/>
+                          <a:cs typeface="+mn-cs"/>
+                        </a:rPr>
+                        <a:t>Header</a:t>
+                      </a:r>
+                      <a:endParaRPr lang="zh-CN" altLang="en-US" sz="1200" b="1" i="0" dirty="0">
+                        <a:solidFill>
+                          <a:schemeClr val="tx1"/>
+                        </a:solidFill>
+                      </a:endParaRPr>
+                    </a:p>
+                  </a:txBody>
+                  <a:tcPr anchor="ctr">
+                    <a:lnL w="12700" cap="flat" cmpd="sng" algn="ctr">
+                      <a:solidFill>
+                        <a:schemeClr val="tx1"/>
+                      </a:solidFill>
+                      <a:prstDash val="solid"/>
+                      <a:round/>
+                      <a:headEnd type="none" w="med" len="med"/>
+                      <a:tailEnd type="none" w="med" len="med"/>
+                    </a:lnL>
+                    <a:lnR w="12700" cap="flat" cmpd="sng" algn="ctr">
+                      <a:solidFill>
+                        <a:schemeClr val="tx1"/>
+                      </a:solidFill>
+                      <a:prstDash val="solid"/>
+                      <a:round/>
+                      <a:headEnd type="none" w="med" len="med"/>
+                      <a:tailEnd type="none" w="med" len="med"/>
+                    </a:lnR>
+                    <a:lnT w="12700" cap="flat" cmpd="sng" algn="ctr">
+                      <a:solidFill>
+                        <a:schemeClr val="tx1"/>
+                      </a:solidFill>
+                      <a:prstDash val="solid"/>
+                      <a:round/>
+                      <a:headEnd type="none" w="med" len="med"/>
+                      <a:tailEnd type="none" w="med" len="med"/>
+                    </a:lnT>
+                    <a:lnB w="12700" cap="flat" cmpd="sng" algn="ctr">
+                      <a:solidFill>
+                        <a:schemeClr val="tx1"/>
+                      </a:solidFill>
+                      <a:prstDash val="solid"/>
+                      <a:round/>
+                      <a:headEnd type="none" w="med" len="med"/>
+                      <a:tailEnd type="none" w="med" len="med"/>
+                    </a:lnB>
+                    <a:lnTlToBr w="12700" cmpd="sng">
+                      <a:noFill/>
+                      <a:prstDash val="solid"/>
+                    </a:lnTlToBr>
+                    <a:lnBlToTr w="12700" cmpd="sng">
+                      <a:noFill/>
+                      <a:prstDash val="solid"/>
+                    </a:lnBlToTr>
+                    <a:solidFill>
+                      <a:srgbClr val="0070C0"/>
+                    </a:solidFill>
+                  </a:tcPr>
+                </a:tc>
+                <a:tc>
+                  <a:txBody>
+                    <a:bodyPr/>
+                    <a:lstStyle/>
+                    <a:p>
+                      <a:pPr algn="ctr"/>
+                      <a:r>
+                        <a:rPr lang="en-US" altLang="zh-CN" sz="1200" b="1" i="0" kern="1200" dirty="0">
+                          <a:solidFill>
+                            <a:schemeClr val="tx1"/>
+                          </a:solidFill>
+                          <a:effectLst/>
+                          <a:latin typeface="+mn-lt"/>
+                          <a:ea typeface="+mn-ea"/>
+                          <a:cs typeface="+mn-cs"/>
+                        </a:rPr>
+                        <a:t>NumDocs</a:t>
+                      </a:r>
+                      <a:endParaRPr lang="zh-CN" altLang="en-US" sz="1200" b="0" i="0" dirty="0">
+                        <a:solidFill>
+                          <a:schemeClr val="tx1"/>
+                        </a:solidFill>
+                      </a:endParaRPr>
+                    </a:p>
+                  </a:txBody>
+                  <a:tcPr anchor="ctr">
+                    <a:lnL w="12700" cap="flat" cmpd="sng" algn="ctr">
+                      <a:solidFill>
+                        <a:schemeClr val="tx1"/>
+                      </a:solidFill>
+                      <a:prstDash val="solid"/>
+                      <a:round/>
+                      <a:headEnd type="none" w="med" len="med"/>
+                      <a:tailEnd type="none" w="med" len="med"/>
+                    </a:lnL>
+                    <a:lnR w="12700" cap="flat" cmpd="sng" algn="ctr">
+                      <a:solidFill>
+                        <a:schemeClr val="tx1"/>
+                      </a:solidFill>
+                      <a:prstDash val="solid"/>
+                      <a:round/>
+                      <a:headEnd type="none" w="med" len="med"/>
+                      <a:tailEnd type="none" w="med" len="med"/>
+                    </a:lnR>
+                    <a:lnT w="12700" cap="flat" cmpd="sng" algn="ctr">
+                      <a:solidFill>
+                        <a:schemeClr val="tx1"/>
+                      </a:solidFill>
+                      <a:prstDash val="solid"/>
+                      <a:round/>
+                      <a:headEnd type="none" w="med" len="med"/>
+                      <a:tailEnd type="none" w="med" len="med"/>
+                    </a:lnT>
+                    <a:lnB w="12700" cap="flat" cmpd="sng" algn="ctr">
+                      <a:solidFill>
+                        <a:schemeClr val="tx1"/>
+                      </a:solidFill>
+                      <a:prstDash val="solid"/>
+                      <a:round/>
+                      <a:headEnd type="none" w="med" len="med"/>
+                      <a:tailEnd type="none" w="med" len="med"/>
+                    </a:lnB>
+                    <a:solidFill>
+                      <a:schemeClr val="bg1"/>
+                    </a:solidFill>
+                  </a:tcPr>
+                </a:tc>
+                <a:tc>
+                  <a:txBody>
+                    <a:bodyPr/>
+                    <a:lstStyle/>
+                    <a:p>
+                      <a:pPr algn="ctr"/>
+                      <a:r>
+                        <a:rPr lang="en-US" altLang="zh-CN" sz="1200" b="1" i="0" kern="1200">
+                          <a:solidFill>
+                            <a:schemeClr val="tx1"/>
+                          </a:solidFill>
+                          <a:effectLst/>
+                          <a:latin typeface="+mn-lt"/>
+                          <a:ea typeface="+mn-ea"/>
+                          <a:cs typeface="+mn-cs"/>
+                        </a:rPr>
+                        <a:t>BlockShift</a:t>
+                      </a:r>
+                      <a:endParaRPr lang="zh-CN" altLang="en-US" sz="1200" b="0" i="0" dirty="0">
+                        <a:solidFill>
+                          <a:schemeClr val="tx1"/>
+                        </a:solidFill>
+                      </a:endParaRPr>
+                    </a:p>
+                  </a:txBody>
+                  <a:tcPr anchor="ctr">
+                    <a:lnL w="12700" cap="flat" cmpd="sng" algn="ctr">
+                      <a:solidFill>
+                        <a:schemeClr val="tx1"/>
+                      </a:solidFill>
+                      <a:prstDash val="solid"/>
+                      <a:round/>
+                      <a:headEnd type="none" w="med" len="med"/>
+                      <a:tailEnd type="none" w="med" len="med"/>
+                    </a:lnL>
+                    <a:lnR w="12700" cap="flat" cmpd="sng" algn="ctr">
+                      <a:solidFill>
+                        <a:schemeClr val="tx1"/>
+                      </a:solidFill>
+                      <a:prstDash val="solid"/>
+                      <a:round/>
+                      <a:headEnd type="none" w="med" len="med"/>
+                      <a:tailEnd type="none" w="med" len="med"/>
+                    </a:lnR>
+                    <a:lnT w="12700" cap="flat" cmpd="sng" algn="ctr">
+                      <a:solidFill>
+                        <a:schemeClr val="tx1"/>
+                      </a:solidFill>
+                      <a:prstDash val="solid"/>
+                      <a:round/>
+                      <a:headEnd type="none" w="med" len="med"/>
+                      <a:tailEnd type="none" w="med" len="med"/>
+                    </a:lnT>
+                    <a:lnB w="12700" cap="flat" cmpd="sng" algn="ctr">
+                      <a:solidFill>
+                        <a:schemeClr val="tx1"/>
+                      </a:solidFill>
+                      <a:prstDash val="solid"/>
+                      <a:round/>
+                      <a:headEnd type="none" w="med" len="med"/>
+                      <a:tailEnd type="none" w="med" len="med"/>
+                    </a:lnB>
+                    <a:solidFill>
+                      <a:schemeClr val="bg1"/>
+                    </a:solidFill>
+                  </a:tcPr>
+                </a:tc>
+                <a:tc>
+                  <a:txBody>
+                    <a:bodyPr/>
+                    <a:lstStyle/>
+                    <a:p>
+                      <a:pPr algn="ctr"/>
+                      <a:r>
+                        <a:rPr lang="en-US" altLang="zh-CN" sz="1200" b="1" i="0">
+                          <a:solidFill>
+                            <a:schemeClr val="tx1"/>
+                          </a:solidFill>
+                        </a:rPr>
+                        <a:t>TotalChunks</a:t>
+                      </a:r>
+                      <a:endParaRPr lang="zh-CN" altLang="en-US" sz="1200" b="1" i="0" dirty="0">
+                        <a:solidFill>
+                          <a:schemeClr val="tx1"/>
+                        </a:solidFill>
+                      </a:endParaRPr>
+                    </a:p>
+                  </a:txBody>
+                  <a:tcPr anchor="ctr">
+                    <a:lnL w="12700" cap="flat" cmpd="sng" algn="ctr">
+                      <a:solidFill>
+                        <a:schemeClr val="tx1"/>
+                      </a:solidFill>
+                      <a:prstDash val="solid"/>
+                      <a:round/>
+                      <a:headEnd type="none" w="med" len="med"/>
+                      <a:tailEnd type="none" w="med" len="med"/>
+                    </a:lnL>
+                    <a:lnR w="12700" cap="flat" cmpd="sng" algn="ctr">
+                      <a:solidFill>
+                        <a:schemeClr val="tx1"/>
+                      </a:solidFill>
+                      <a:prstDash val="solid"/>
+                      <a:round/>
+                      <a:headEnd type="none" w="med" len="med"/>
+                      <a:tailEnd type="none" w="med" len="med"/>
+                    </a:lnR>
+                    <a:lnT w="12700" cap="flat" cmpd="sng" algn="ctr">
+                      <a:solidFill>
+                        <a:schemeClr val="tx1"/>
+                      </a:solidFill>
+                      <a:prstDash val="solid"/>
+                      <a:round/>
+                      <a:headEnd type="none" w="med" len="med"/>
+                      <a:tailEnd type="none" w="med" len="med"/>
+                    </a:lnT>
+                    <a:lnB w="12700" cap="flat" cmpd="sng" algn="ctr">
+                      <a:solidFill>
+                        <a:schemeClr val="tx1"/>
+                      </a:solidFill>
+                      <a:prstDash val="solid"/>
+                      <a:round/>
+                      <a:headEnd type="none" w="med" len="med"/>
+                      <a:tailEnd type="none" w="med" len="med"/>
+                    </a:lnB>
+                    <a:solidFill>
+                      <a:schemeClr val="bg1">
+                        <a:lumMod val="95000"/>
+                      </a:schemeClr>
+                    </a:solidFill>
+                  </a:tcPr>
+                </a:tc>
+                <a:tc>
+                  <a:txBody>
+                    <a:bodyPr/>
+                    <a:lstStyle/>
+                    <a:p>
+                      <a:pPr algn="ctr"/>
+                      <a:r>
+                        <a:rPr lang="en-US" altLang="zh-CN" sz="1200" b="1" i="0">
+                          <a:solidFill>
+                            <a:schemeClr val="tx1"/>
+                          </a:solidFill>
+                        </a:rPr>
+                        <a:t>NumDocsIndex</a:t>
+                      </a:r>
+                      <a:endParaRPr lang="zh-CN" altLang="en-US" sz="1200" b="0" i="0" dirty="0">
+                        <a:solidFill>
+                          <a:schemeClr val="tx1"/>
+                        </a:solidFill>
+                      </a:endParaRPr>
+                    </a:p>
+                  </a:txBody>
+                  <a:tcPr anchor="ctr">
+                    <a:lnL w="12700" cap="flat" cmpd="sng" algn="ctr">
+                      <a:solidFill>
+                        <a:schemeClr val="tx1"/>
+                      </a:solidFill>
+                      <a:prstDash val="solid"/>
+                      <a:round/>
+                      <a:headEnd type="none" w="med" len="med"/>
+                      <a:tailEnd type="none" w="med" len="med"/>
+                    </a:lnL>
+                    <a:lnR w="12700" cap="flat" cmpd="sng" algn="ctr">
+                      <a:solidFill>
+                        <a:schemeClr val="tx1"/>
+                      </a:solidFill>
+                      <a:prstDash val="solid"/>
+                      <a:round/>
+                      <a:headEnd type="none" w="med" len="med"/>
+                      <a:tailEnd type="none" w="med" len="med"/>
+                    </a:lnR>
+                    <a:lnT w="12700" cap="flat" cmpd="sng" algn="ctr">
+                      <a:solidFill>
+                        <a:schemeClr val="tx1"/>
+                      </a:solidFill>
+                      <a:prstDash val="solid"/>
+                      <a:round/>
+                      <a:headEnd type="none" w="med" len="med"/>
+                      <a:tailEnd type="none" w="med" len="med"/>
+                    </a:lnT>
+                    <a:lnB w="12700" cap="flat" cmpd="sng" algn="ctr">
+                      <a:solidFill>
+                        <a:schemeClr val="tx1"/>
+                      </a:solidFill>
+                      <a:prstDash val="solid"/>
+                      <a:round/>
+                      <a:headEnd type="none" w="med" len="med"/>
+                      <a:tailEnd type="none" w="med" len="med"/>
+                    </a:lnB>
+                    <a:solidFill>
+                      <a:schemeClr val="bg1"/>
+                    </a:solidFill>
+                  </a:tcPr>
+                </a:tc>
+                <a:tc>
+                  <a:txBody>
+                    <a:bodyPr/>
+                    <a:lstStyle/>
+                    <a:p>
+                      <a:pPr algn="ctr"/>
+                      <a:r>
+                        <a:rPr lang="en-US" altLang="zh-CN" sz="1200" b="1" i="0" dirty="0">
+                          <a:solidFill>
+                            <a:schemeClr val="tx1"/>
+                          </a:solidFill>
+                        </a:rPr>
+                        <a:t>NumDocsMeta</a:t>
+                      </a:r>
+                      <a:endParaRPr lang="zh-CN" altLang="en-US" sz="1200" b="0" i="0" dirty="0">
+                        <a:solidFill>
+                          <a:schemeClr val="tx1"/>
+                        </a:solidFill>
+                      </a:endParaRPr>
+                    </a:p>
+                  </a:txBody>
+                  <a:tcPr anchor="ctr">
+                    <a:lnL w="12700" cap="flat" cmpd="sng" algn="ctr">
+                      <a:solidFill>
+                        <a:schemeClr val="tx1"/>
+                      </a:solidFill>
+                      <a:prstDash val="solid"/>
+                      <a:round/>
+                      <a:headEnd type="none" w="med" len="med"/>
+                      <a:tailEnd type="none" w="med" len="med"/>
+                    </a:lnL>
+                    <a:lnR w="12700" cap="flat" cmpd="sng" algn="ctr">
+                      <a:solidFill>
+                        <a:schemeClr val="tx1"/>
+                      </a:solidFill>
+                      <a:prstDash val="solid"/>
+                      <a:round/>
+                      <a:headEnd type="none" w="med" len="med"/>
+                      <a:tailEnd type="none" w="med" len="med"/>
+                    </a:lnR>
+                    <a:lnT w="12700" cap="flat" cmpd="sng" algn="ctr">
+                      <a:solidFill>
+                        <a:schemeClr val="tx1"/>
+                      </a:solidFill>
+                      <a:prstDash val="solid"/>
+                      <a:round/>
+                      <a:headEnd type="none" w="med" len="med"/>
+                      <a:tailEnd type="none" w="med" len="med"/>
+                    </a:lnT>
+                    <a:lnB w="12700" cap="flat" cmpd="sng" algn="ctr">
+                      <a:solidFill>
+                        <a:schemeClr val="tx1"/>
+                      </a:solidFill>
+                      <a:prstDash val="solid"/>
+                      <a:round/>
+                      <a:headEnd type="none" w="med" len="med"/>
+                      <a:tailEnd type="none" w="med" len="med"/>
+                    </a:lnB>
+                    <a:solidFill>
+                      <a:schemeClr val="tx2">
+                        <a:lumMod val="60000"/>
+                        <a:lumOff val="40000"/>
+                      </a:schemeClr>
+                    </a:solidFill>
+                  </a:tcPr>
+                </a:tc>
+                <a:tc>
+                  <a:txBody>
+                    <a:bodyPr/>
+                    <a:lstStyle/>
+                    <a:p>
+                      <a:pPr algn="ctr"/>
+                      <a:r>
+                        <a:rPr lang="en-US" altLang="zh-CN" sz="1200" b="1" i="0" kern="1200">
+                          <a:solidFill>
+                            <a:schemeClr val="tx1"/>
+                          </a:solidFill>
+                          <a:effectLst/>
+                          <a:latin typeface="+mn-lt"/>
+                          <a:ea typeface="+mn-ea"/>
+                          <a:cs typeface="+mn-cs"/>
+                        </a:rPr>
+                        <a:t>StartPointsIndex</a:t>
+                      </a:r>
+                      <a:endParaRPr lang="zh-CN" altLang="en-US" sz="1200" b="0" i="0" dirty="0">
+                        <a:solidFill>
+                          <a:schemeClr val="tx1"/>
+                        </a:solidFill>
+                      </a:endParaRPr>
+                    </a:p>
+                  </a:txBody>
+                  <a:tcPr anchor="ctr">
+                    <a:lnL w="12700" cap="flat" cmpd="sng" algn="ctr">
+                      <a:solidFill>
+                        <a:schemeClr val="tx1"/>
+                      </a:solidFill>
+                      <a:prstDash val="solid"/>
+                      <a:round/>
+                      <a:headEnd type="none" w="med" len="med"/>
+                      <a:tailEnd type="none" w="med" len="med"/>
+                    </a:lnL>
+                    <a:lnR w="12700" cap="flat" cmpd="sng" algn="ctr">
+                      <a:solidFill>
+                        <a:schemeClr val="tx1"/>
+                      </a:solidFill>
+                      <a:prstDash val="solid"/>
+                      <a:round/>
+                      <a:headEnd type="none" w="med" len="med"/>
+                      <a:tailEnd type="none" w="med" len="med"/>
+                    </a:lnR>
+                    <a:lnT w="12700" cap="flat" cmpd="sng" algn="ctr">
+                      <a:solidFill>
+                        <a:schemeClr val="tx1"/>
+                      </a:solidFill>
+                      <a:prstDash val="solid"/>
+                      <a:round/>
+                      <a:headEnd type="none" w="med" len="med"/>
+                      <a:tailEnd type="none" w="med" len="med"/>
+                    </a:lnT>
+                    <a:lnB w="12700" cap="flat" cmpd="sng" algn="ctr">
+                      <a:solidFill>
+                        <a:schemeClr val="tx1"/>
+                      </a:solidFill>
+                      <a:prstDash val="solid"/>
+                      <a:round/>
+                      <a:headEnd type="none" w="med" len="med"/>
+                      <a:tailEnd type="none" w="med" len="med"/>
+                    </a:lnB>
+                    <a:solidFill>
+                      <a:schemeClr val="bg1">
+                        <a:lumMod val="95000"/>
+                      </a:schemeClr>
+                    </a:solidFill>
+                  </a:tcPr>
+                </a:tc>
+                <a:tc>
+                  <a:txBody>
+                    <a:bodyPr/>
+                    <a:lstStyle/>
+                    <a:p>
+                      <a:pPr algn="ctr"/>
+                      <a:r>
+                        <a:rPr lang="en-US" altLang="zh-CN" sz="1200" b="1" i="0" kern="1200">
+                          <a:solidFill>
+                            <a:schemeClr val="tx1"/>
+                          </a:solidFill>
+                          <a:effectLst/>
+                          <a:latin typeface="+mn-lt"/>
+                          <a:ea typeface="+mn-ea"/>
+                          <a:cs typeface="+mn-cs"/>
+                        </a:rPr>
+                        <a:t>StartPointsMeta</a:t>
+                      </a:r>
+                      <a:endParaRPr lang="zh-CN" altLang="en-US" sz="1200" b="0" i="0" dirty="0">
+                        <a:solidFill>
+                          <a:schemeClr val="tx1"/>
+                        </a:solidFill>
+                      </a:endParaRPr>
+                    </a:p>
+                  </a:txBody>
+                  <a:tcPr anchor="ctr">
+                    <a:lnL w="12700" cap="flat" cmpd="sng" algn="ctr">
+                      <a:solidFill>
+                        <a:schemeClr val="tx1"/>
+                      </a:solidFill>
+                      <a:prstDash val="solid"/>
+                      <a:round/>
+                      <a:headEnd type="none" w="med" len="med"/>
+                      <a:tailEnd type="none" w="med" len="med"/>
+                    </a:lnL>
+                    <a:lnR w="12700" cap="flat" cmpd="sng" algn="ctr">
+                      <a:solidFill>
+                        <a:schemeClr val="tx1"/>
+                      </a:solidFill>
+                      <a:prstDash val="solid"/>
+                      <a:round/>
+                      <a:headEnd type="none" w="med" len="med"/>
+                      <a:tailEnd type="none" w="med" len="med"/>
+                    </a:lnR>
+                    <a:lnT w="12700" cap="flat" cmpd="sng" algn="ctr">
+                      <a:solidFill>
+                        <a:schemeClr val="tx1"/>
+                      </a:solidFill>
+                      <a:prstDash val="solid"/>
+                      <a:round/>
+                      <a:headEnd type="none" w="med" len="med"/>
+                      <a:tailEnd type="none" w="med" len="med"/>
+                    </a:lnT>
+                    <a:lnB w="12700" cap="flat" cmpd="sng" algn="ctr">
+                      <a:solidFill>
+                        <a:schemeClr val="tx1"/>
+                      </a:solidFill>
+                      <a:prstDash val="solid"/>
+                      <a:round/>
+                      <a:headEnd type="none" w="med" len="med"/>
+                      <a:tailEnd type="none" w="med" len="med"/>
+                    </a:lnB>
+                    <a:solidFill>
+                      <a:schemeClr val="accent2">
+                        <a:lumMod val="60000"/>
+                        <a:lumOff val="40000"/>
+                      </a:schemeClr>
+                    </a:solidFill>
+                  </a:tcPr>
+                </a:tc>
+                <a:tc>
+                  <a:txBody>
+                    <a:bodyPr/>
+                    <a:lstStyle/>
+                    <a:p>
+                      <a:pPr algn="ctr"/>
+                      <a:r>
+                        <a:rPr lang="en-US" altLang="zh-CN" sz="1200" b="1" i="0" dirty="0">
+                          <a:solidFill>
+                            <a:schemeClr val="tx1"/>
+                          </a:solidFill>
+                        </a:rPr>
+                        <a:t>SPEndPointer</a:t>
+                      </a:r>
+                      <a:endParaRPr lang="zh-CN" altLang="en-US" sz="1200" b="1" i="0" dirty="0">
+                        <a:solidFill>
+                          <a:schemeClr val="tx1"/>
+                        </a:solidFill>
+                      </a:endParaRPr>
+                    </a:p>
+                  </a:txBody>
+                  <a:tcPr anchor="ctr">
+                    <a:lnL w="12700" cap="flat" cmpd="sng" algn="ctr">
+                      <a:solidFill>
+                        <a:schemeClr val="tx1"/>
+                      </a:solidFill>
+                      <a:prstDash val="solid"/>
+                      <a:round/>
+                      <a:headEnd type="none" w="med" len="med"/>
+                      <a:tailEnd type="none" w="med" len="med"/>
+                    </a:lnL>
+                    <a:lnR w="12700" cap="flat" cmpd="sng" algn="ctr">
+                      <a:solidFill>
+                        <a:schemeClr val="tx1"/>
+                      </a:solidFill>
+                      <a:prstDash val="solid"/>
+                      <a:round/>
+                      <a:headEnd type="none" w="med" len="med"/>
+                      <a:tailEnd type="none" w="med" len="med"/>
+                    </a:lnR>
+                    <a:lnT w="12700" cap="flat" cmpd="sng" algn="ctr">
+                      <a:solidFill>
+                        <a:schemeClr val="tx1"/>
+                      </a:solidFill>
+                      <a:prstDash val="solid"/>
+                      <a:round/>
+                      <a:headEnd type="none" w="med" len="med"/>
+                      <a:tailEnd type="none" w="med" len="med"/>
+                    </a:lnT>
+                    <a:lnB w="12700" cap="flat" cmpd="sng" algn="ctr">
+                      <a:solidFill>
+                        <a:schemeClr val="tx1"/>
+                      </a:solidFill>
+                      <a:prstDash val="solid"/>
+                      <a:round/>
+                      <a:headEnd type="none" w="med" len="med"/>
+                      <a:tailEnd type="none" w="med" len="med"/>
+                    </a:lnB>
+                    <a:noFill/>
+                  </a:tcPr>
+                </a:tc>
+                <a:tc>
+                  <a:txBody>
+                    <a:bodyPr/>
+                    <a:lstStyle/>
+                    <a:p>
+                      <a:pPr algn="ctr"/>
+                      <a:r>
+                        <a:rPr lang="en-US" altLang="zh-CN" sz="1200" b="1" i="0" dirty="0">
+                          <a:solidFill>
+                            <a:schemeClr val="tx1"/>
+                          </a:solidFill>
+                        </a:rPr>
+                        <a:t>maxPointer</a:t>
+                      </a:r>
+                      <a:endParaRPr lang="zh-CN" altLang="en-US" sz="1200" b="1" i="0" dirty="0">
+                        <a:solidFill>
+                          <a:schemeClr val="tx1"/>
+                        </a:solidFill>
+                      </a:endParaRPr>
+                    </a:p>
+                  </a:txBody>
+                  <a:tcPr anchor="ctr">
+                    <a:lnL w="12700" cap="flat" cmpd="sng" algn="ctr">
+                      <a:solidFill>
+                        <a:schemeClr val="tx1"/>
+                      </a:solidFill>
+                      <a:prstDash val="solid"/>
+                      <a:round/>
+                      <a:headEnd type="none" w="med" len="med"/>
+                      <a:tailEnd type="none" w="med" len="med"/>
+                    </a:lnL>
+                    <a:lnR w="12700" cap="flat" cmpd="sng" algn="ctr">
+                      <a:solidFill>
+                        <a:schemeClr val="tx1"/>
+                      </a:solidFill>
+                      <a:prstDash val="solid"/>
+                      <a:round/>
+                      <a:headEnd type="none" w="med" len="med"/>
+                      <a:tailEnd type="none" w="med" len="med"/>
+                    </a:lnR>
+                    <a:lnT w="12700" cap="flat" cmpd="sng" algn="ctr">
+                      <a:solidFill>
+                        <a:schemeClr val="tx1"/>
+                      </a:solidFill>
+                      <a:prstDash val="solid"/>
+                      <a:round/>
+                      <a:headEnd type="none" w="med" len="med"/>
+                      <a:tailEnd type="none" w="med" len="med"/>
+                    </a:lnT>
+                    <a:lnB w="12700" cap="flat" cmpd="sng" algn="ctr">
+                      <a:solidFill>
+                        <a:schemeClr val="tx1"/>
+                      </a:solidFill>
+                      <a:prstDash val="solid"/>
+                      <a:round/>
+                      <a:headEnd type="none" w="med" len="med"/>
+                      <a:tailEnd type="none" w="med" len="med"/>
+                    </a:lnB>
+                    <a:noFill/>
+                  </a:tcPr>
+                </a:tc>
+                <a:tc>
+                  <a:txBody>
+                    <a:bodyPr/>
+                    <a:lstStyle/>
+                    <a:p>
+                      <a:pPr algn="ctr"/>
+                      <a:r>
+                        <a:rPr lang="en-US" altLang="zh-CN" sz="1200" b="1" i="0" dirty="0">
+                          <a:solidFill>
+                            <a:schemeClr val="tx1"/>
+                          </a:solidFill>
+                        </a:rPr>
+                        <a:t>Footer</a:t>
+                      </a:r>
+                      <a:endParaRPr lang="zh-CN" altLang="en-US" sz="1200" b="1" i="0" dirty="0">
+                        <a:solidFill>
+                          <a:schemeClr val="tx1"/>
+                        </a:solidFill>
+                      </a:endParaRPr>
+                    </a:p>
+                  </a:txBody>
+                  <a:tcPr anchor="ctr">
+                    <a:lnL w="12700" cap="flat" cmpd="sng" algn="ctr">
+                      <a:solidFill>
+                        <a:schemeClr val="tx1"/>
+                      </a:solidFill>
+                      <a:prstDash val="solid"/>
+                      <a:round/>
+                      <a:headEnd type="none" w="med" len="med"/>
+                      <a:tailEnd type="none" w="med" len="med"/>
+                    </a:lnL>
+                    <a:lnR w="12700" cap="flat" cmpd="sng" algn="ctr">
+                      <a:solidFill>
+                        <a:schemeClr val="tx1"/>
+                      </a:solidFill>
+                      <a:prstDash val="solid"/>
+                      <a:round/>
+                      <a:headEnd type="none" w="med" len="med"/>
+                      <a:tailEnd type="none" w="med" len="med"/>
+                    </a:lnR>
+                    <a:lnT w="12700" cap="flat" cmpd="sng" algn="ctr">
+                      <a:solidFill>
+                        <a:schemeClr val="tx1"/>
+                      </a:solidFill>
+                      <a:prstDash val="solid"/>
+                      <a:round/>
+                      <a:headEnd type="none" w="med" len="med"/>
+                      <a:tailEnd type="none" w="med" len="med"/>
+                    </a:lnT>
+                    <a:lnB w="12700" cap="flat" cmpd="sng" algn="ctr">
+                      <a:solidFill>
+                        <a:schemeClr val="tx1"/>
+                      </a:solidFill>
+                      <a:prstDash val="solid"/>
+                      <a:round/>
+                      <a:headEnd type="none" w="med" len="med"/>
+                      <a:tailEnd type="none" w="med" len="med"/>
+                    </a:lnB>
+                    <a:solidFill>
+                      <a:srgbClr val="7030A0"/>
+                    </a:solidFill>
+                  </a:tcPr>
+                </a:tc>
+                <a:extLst>
+                  <a:ext uri="{0D108BD9-81ED-4DB2-BD59-A6C34878D82A}">
+                    <a16:rowId xmlns:a16="http://schemas.microsoft.com/office/drawing/2014/main" val="1027363210"/>
+                  </a:ext>
+                </a:extLst>
+              </a:tr>
+            </a:tbl>
+          </a:graphicData>
+        </a:graphic>
+      </p:graphicFrame>
     </p:spTree>
     <p:extLst>
       <p:ext uri="{BB962C8B-B14F-4D97-AF65-F5344CB8AC3E}">

</xml_diff>

<commit_message>
增加pyhton demo 新增 DirectMonotonicWriter&&Reader 的文章
</commit_message>
<xml_diff>
--- a/blog/Lucene/Index/索引文件的生成/索引文件的生成（二十四）/fdx&&fdt&&fdm.pptx
+++ b/blog/Lucene/Index/索引文件的生成/索引文件的生成（二十四）/fdx&&fdt&&fdm.pptx
@@ -277,7 +277,7 @@
           <a:p>
             <a:fld id="{2579BE28-8116-0E46-93C2-74159096E69E}" type="datetimeFigureOut">
               <a:rPr kumimoji="1" lang="zh-CN" altLang="en-US" smtClean="0"/>
-              <a:t>2020/10/19</a:t>
+              <a:t>2020/10/30</a:t>
             </a:fld>
             <a:endParaRPr kumimoji="1" lang="zh-CN" altLang="en-US"/>
           </a:p>
@@ -475,7 +475,7 @@
           <a:p>
             <a:fld id="{2579BE28-8116-0E46-93C2-74159096E69E}" type="datetimeFigureOut">
               <a:rPr kumimoji="1" lang="zh-CN" altLang="en-US" smtClean="0"/>
-              <a:t>2020/10/19</a:t>
+              <a:t>2020/10/30</a:t>
             </a:fld>
             <a:endParaRPr kumimoji="1" lang="zh-CN" altLang="en-US"/>
           </a:p>
@@ -683,7 +683,7 @@
           <a:p>
             <a:fld id="{2579BE28-8116-0E46-93C2-74159096E69E}" type="datetimeFigureOut">
               <a:rPr kumimoji="1" lang="zh-CN" altLang="en-US" smtClean="0"/>
-              <a:t>2020/10/19</a:t>
+              <a:t>2020/10/30</a:t>
             </a:fld>
             <a:endParaRPr kumimoji="1" lang="zh-CN" altLang="en-US"/>
           </a:p>
@@ -881,7 +881,7 @@
           <a:p>
             <a:fld id="{2579BE28-8116-0E46-93C2-74159096E69E}" type="datetimeFigureOut">
               <a:rPr kumimoji="1" lang="zh-CN" altLang="en-US" smtClean="0"/>
-              <a:t>2020/10/19</a:t>
+              <a:t>2020/10/30</a:t>
             </a:fld>
             <a:endParaRPr kumimoji="1" lang="zh-CN" altLang="en-US"/>
           </a:p>
@@ -1156,7 +1156,7 @@
           <a:p>
             <a:fld id="{2579BE28-8116-0E46-93C2-74159096E69E}" type="datetimeFigureOut">
               <a:rPr kumimoji="1" lang="zh-CN" altLang="en-US" smtClean="0"/>
-              <a:t>2020/10/19</a:t>
+              <a:t>2020/10/30</a:t>
             </a:fld>
             <a:endParaRPr kumimoji="1" lang="zh-CN" altLang="en-US"/>
           </a:p>
@@ -1421,7 +1421,7 @@
           <a:p>
             <a:fld id="{2579BE28-8116-0E46-93C2-74159096E69E}" type="datetimeFigureOut">
               <a:rPr kumimoji="1" lang="zh-CN" altLang="en-US" smtClean="0"/>
-              <a:t>2020/10/19</a:t>
+              <a:t>2020/10/30</a:t>
             </a:fld>
             <a:endParaRPr kumimoji="1" lang="zh-CN" altLang="en-US"/>
           </a:p>
@@ -1833,7 +1833,7 @@
           <a:p>
             <a:fld id="{2579BE28-8116-0E46-93C2-74159096E69E}" type="datetimeFigureOut">
               <a:rPr kumimoji="1" lang="zh-CN" altLang="en-US" smtClean="0"/>
-              <a:t>2020/10/19</a:t>
+              <a:t>2020/10/30</a:t>
             </a:fld>
             <a:endParaRPr kumimoji="1" lang="zh-CN" altLang="en-US"/>
           </a:p>
@@ -1974,7 +1974,7 @@
           <a:p>
             <a:fld id="{2579BE28-8116-0E46-93C2-74159096E69E}" type="datetimeFigureOut">
               <a:rPr kumimoji="1" lang="zh-CN" altLang="en-US" smtClean="0"/>
-              <a:t>2020/10/19</a:t>
+              <a:t>2020/10/30</a:t>
             </a:fld>
             <a:endParaRPr kumimoji="1" lang="zh-CN" altLang="en-US"/>
           </a:p>
@@ -2087,7 +2087,7 @@
           <a:p>
             <a:fld id="{2579BE28-8116-0E46-93C2-74159096E69E}" type="datetimeFigureOut">
               <a:rPr kumimoji="1" lang="zh-CN" altLang="en-US" smtClean="0"/>
-              <a:t>2020/10/19</a:t>
+              <a:t>2020/10/30</a:t>
             </a:fld>
             <a:endParaRPr kumimoji="1" lang="zh-CN" altLang="en-US"/>
           </a:p>
@@ -2398,7 +2398,7 @@
           <a:p>
             <a:fld id="{2579BE28-8116-0E46-93C2-74159096E69E}" type="datetimeFigureOut">
               <a:rPr kumimoji="1" lang="zh-CN" altLang="en-US" smtClean="0"/>
-              <a:t>2020/10/19</a:t>
+              <a:t>2020/10/30</a:t>
             </a:fld>
             <a:endParaRPr kumimoji="1" lang="zh-CN" altLang="en-US"/>
           </a:p>
@@ -2686,7 +2686,7 @@
           <a:p>
             <a:fld id="{2579BE28-8116-0E46-93C2-74159096E69E}" type="datetimeFigureOut">
               <a:rPr kumimoji="1" lang="zh-CN" altLang="en-US" smtClean="0"/>
-              <a:t>2020/10/19</a:t>
+              <a:t>2020/10/30</a:t>
             </a:fld>
             <a:endParaRPr kumimoji="1" lang="zh-CN" altLang="en-US"/>
           </a:p>
@@ -2927,7 +2927,7 @@
           <a:p>
             <a:fld id="{2579BE28-8116-0E46-93C2-74159096E69E}" type="datetimeFigureOut">
               <a:rPr kumimoji="1" lang="zh-CN" altLang="en-US" smtClean="0"/>
-              <a:t>2020/10/19</a:t>
+              <a:t>2020/10/30</a:t>
             </a:fld>
             <a:endParaRPr kumimoji="1" lang="zh-CN" altLang="en-US"/>
           </a:p>
@@ -14563,7 +14563,7 @@
           <p:nvPr>
             <p:extLst>
               <p:ext uri="{D42A27DB-BD31-4B8C-83A1-F6EECF244321}">
-                <p14:modId xmlns:p14="http://schemas.microsoft.com/office/powerpoint/2010/main" val="1410545195"/>
+                <p14:modId xmlns:p14="http://schemas.microsoft.com/office/powerpoint/2010/main" val="43710183"/>
               </p:ext>
             </p:extLst>
           </p:nvPr>
@@ -14747,7 +14747,7 @@
                             <a:schemeClr val="tx1"/>
                           </a:solidFill>
                         </a:rPr>
-                        <a:t>Length</a:t>
+                        <a:t>Offset</a:t>
                       </a:r>
                       <a:endParaRPr lang="zh-CN" altLang="en-US" sz="1200" b="1" i="0" dirty="0">
                         <a:solidFill>
@@ -15549,7 +15549,7 @@
           <p:nvPr>
             <p:extLst>
               <p:ext uri="{D42A27DB-BD31-4B8C-83A1-F6EECF244321}">
-                <p14:modId xmlns:p14="http://schemas.microsoft.com/office/powerpoint/2010/main" val="992044815"/>
+                <p14:modId xmlns:p14="http://schemas.microsoft.com/office/powerpoint/2010/main" val="2970277657"/>
               </p:ext>
             </p:extLst>
           </p:nvPr>
@@ -15733,7 +15733,7 @@
                             <a:schemeClr val="tx1"/>
                           </a:solidFill>
                         </a:rPr>
-                        <a:t>Length</a:t>
+                        <a:t>Offset</a:t>
                       </a:r>
                       <a:endParaRPr lang="zh-CN" altLang="en-US" sz="1200" b="1" i="0" dirty="0">
                         <a:solidFill>
@@ -16527,7 +16527,7 @@
           <p:nvPr>
             <p:extLst>
               <p:ext uri="{D42A27DB-BD31-4B8C-83A1-F6EECF244321}">
-                <p14:modId xmlns:p14="http://schemas.microsoft.com/office/powerpoint/2010/main" val="1734659233"/>
+                <p14:modId xmlns:p14="http://schemas.microsoft.com/office/powerpoint/2010/main" val="1217005819"/>
               </p:ext>
             </p:extLst>
           </p:nvPr>
@@ -16711,7 +16711,7 @@
                             <a:schemeClr val="tx1"/>
                           </a:solidFill>
                         </a:rPr>
-                        <a:t>Length</a:t>
+                        <a:t>Offset</a:t>
                       </a:r>
                       <a:endParaRPr lang="zh-CN" altLang="en-US" sz="1200" b="1" i="0" dirty="0">
                         <a:solidFill>
@@ -17275,7 +17275,7 @@
           <p:nvPr>
             <p:extLst>
               <p:ext uri="{D42A27DB-BD31-4B8C-83A1-F6EECF244321}">
-                <p14:modId xmlns:p14="http://schemas.microsoft.com/office/powerpoint/2010/main" val="3593982492"/>
+                <p14:modId xmlns:p14="http://schemas.microsoft.com/office/powerpoint/2010/main" val="574670230"/>
               </p:ext>
             </p:extLst>
           </p:nvPr>
@@ -17459,7 +17459,7 @@
                             <a:schemeClr val="tx1"/>
                           </a:solidFill>
                         </a:rPr>
-                        <a:t>Length</a:t>
+                        <a:t>Offset</a:t>
                       </a:r>
                       <a:endParaRPr lang="zh-CN" altLang="en-US" sz="1200" b="1" i="0" dirty="0">
                         <a:solidFill>

</xml_diff>